<commit_message>
Updates to align the chapters.
</commit_message>
<xml_diff>
--- a/Slides/Chapter05.pptx
+++ b/Slides/Chapter05.pptx
@@ -2,7 +2,7 @@
 <file path=ppt/presentation.xml><?xml version="1.0" encoding="utf-8"?>
 <p:presentation xmlns:a="http://schemas.openxmlformats.org/drawingml/2006/main" xmlns:r="http://schemas.openxmlformats.org/officeDocument/2006/relationships" xmlns:p="http://schemas.openxmlformats.org/presentationml/2006/main" saveSubsetFonts="1" autoCompressPictures="0">
   <p:sldMasterIdLst>
-    <p:sldMasterId id="2147483660" r:id="rId1"/>
+    <p:sldMasterId id="2147483668" r:id="rId1"/>
   </p:sldMasterIdLst>
   <p:notesMasterIdLst>
     <p:notesMasterId r:id="rId72"/>
@@ -266,7 +266,7 @@
           <a:p>
             <a:fld id="{1014AD53-B32D-C140-B1EF-3AA5C844E3CC}" type="datetimeFigureOut">
               <a:rPr lang="en-US" smtClean="0"/>
-              <a:t>10/23/25</a:t>
+              <a:t>10/27/25</a:t>
             </a:fld>
             <a:endParaRPr lang="en-US"/>
           </a:p>
@@ -762,7 +762,7 @@
     </p:spTree>
     <p:extLst>
       <p:ext uri="{BB962C8B-B14F-4D97-AF65-F5344CB8AC3E}">
-        <p14:creationId xmlns:p14="http://schemas.microsoft.com/office/powerpoint/2010/main" val="3410786149"/>
+        <p14:creationId xmlns:p14="http://schemas.microsoft.com/office/powerpoint/2010/main" val="1746631109"/>
       </p:ext>
     </p:extLst>
   </p:cSld>
@@ -902,9 +902,9 @@
           <a:bodyPr/>
           <a:lstStyle/>
           <a:p>
-            <a:fld id="{0D99093C-E824-EC48-B77A-280F17DA5D37}" type="datetimeFigureOut">
+            <a:fld id="{BD6E15D8-D685-1144-AD8A-ADBAA9D63DF8}" type="datetime1">
               <a:rPr lang="en-US" smtClean="0"/>
-              <a:t>10/23/25</a:t>
+              <a:t>10/27/25</a:t>
             </a:fld>
             <a:endParaRPr lang="en-US"/>
           </a:p>
@@ -955,7 +955,7 @@
     </p:spTree>
     <p:extLst>
       <p:ext uri="{BB962C8B-B14F-4D97-AF65-F5344CB8AC3E}">
-        <p14:creationId xmlns:p14="http://schemas.microsoft.com/office/powerpoint/2010/main" val="3776455051"/>
+        <p14:creationId xmlns:p14="http://schemas.microsoft.com/office/powerpoint/2010/main" val="1068914041"/>
       </p:ext>
     </p:extLst>
   </p:cSld>
@@ -1083,9 +1083,9 @@
           <a:bodyPr/>
           <a:lstStyle/>
           <a:p>
-            <a:fld id="{0D99093C-E824-EC48-B77A-280F17DA5D37}" type="datetimeFigureOut">
+            <a:fld id="{D14690C4-8DBE-C744-9F73-39F8C56C05AA}" type="datetime1">
               <a:rPr lang="en-US" smtClean="0"/>
-              <a:t>10/23/25</a:t>
+              <a:t>10/27/25</a:t>
             </a:fld>
             <a:endParaRPr lang="en-US"/>
           </a:p>
@@ -1136,7 +1136,7 @@
     </p:spTree>
     <p:extLst>
       <p:ext uri="{BB962C8B-B14F-4D97-AF65-F5344CB8AC3E}">
-        <p14:creationId xmlns:p14="http://schemas.microsoft.com/office/powerpoint/2010/main" val="2577880188"/>
+        <p14:creationId xmlns:p14="http://schemas.microsoft.com/office/powerpoint/2010/main" val="601771503"/>
       </p:ext>
     </p:extLst>
   </p:cSld>
@@ -1253,9 +1253,9 @@
           <a:bodyPr/>
           <a:lstStyle/>
           <a:p>
-            <a:fld id="{0D99093C-E824-EC48-B77A-280F17DA5D37}" type="datetimeFigureOut">
+            <a:fld id="{DCBD7BB8-3C64-944A-871D-EEFF8C4987C2}" type="datetime1">
               <a:rPr lang="en-US" smtClean="0"/>
-              <a:t>10/23/25</a:t>
+              <a:t>10/27/25</a:t>
             </a:fld>
             <a:endParaRPr lang="en-US"/>
           </a:p>
@@ -1356,7 +1356,7 @@
     </p:spTree>
     <p:extLst>
       <p:ext uri="{BB962C8B-B14F-4D97-AF65-F5344CB8AC3E}">
-        <p14:creationId xmlns:p14="http://schemas.microsoft.com/office/powerpoint/2010/main" val="1673116157"/>
+        <p14:creationId xmlns:p14="http://schemas.microsoft.com/office/powerpoint/2010/main" val="3573244763"/>
       </p:ext>
     </p:extLst>
   </p:cSld>
@@ -1596,9 +1596,9 @@
           <a:bodyPr/>
           <a:lstStyle/>
           <a:p>
-            <a:fld id="{0D99093C-E824-EC48-B77A-280F17DA5D37}" type="datetimeFigureOut">
+            <a:fld id="{BB15186C-C400-F34C-B36B-E1F3395EE67C}" type="datetime1">
               <a:rPr lang="en-US" smtClean="0"/>
-              <a:t>10/23/25</a:t>
+              <a:t>10/27/25</a:t>
             </a:fld>
             <a:endParaRPr lang="en-US"/>
           </a:p>
@@ -1649,7 +1649,7 @@
     </p:spTree>
     <p:extLst>
       <p:ext uri="{BB962C8B-B14F-4D97-AF65-F5344CB8AC3E}">
-        <p14:creationId xmlns:p14="http://schemas.microsoft.com/office/powerpoint/2010/main" val="1357322360"/>
+        <p14:creationId xmlns:p14="http://schemas.microsoft.com/office/powerpoint/2010/main" val="2824154125"/>
       </p:ext>
     </p:extLst>
   </p:cSld>
@@ -1733,9 +1733,9 @@
           <a:bodyPr/>
           <a:lstStyle/>
           <a:p>
-            <a:fld id="{0D99093C-E824-EC48-B77A-280F17DA5D37}" type="datetimeFigureOut">
+            <a:fld id="{58058098-C04E-CB4D-B0EA-03E8D230EE4A}" type="datetime1">
               <a:rPr lang="en-US" smtClean="0"/>
-              <a:t>10/23/25</a:t>
+              <a:t>10/27/25</a:t>
             </a:fld>
             <a:endParaRPr lang="en-US"/>
           </a:p>
@@ -1786,7 +1786,7 @@
     </p:spTree>
     <p:extLst>
       <p:ext uri="{BB962C8B-B14F-4D97-AF65-F5344CB8AC3E}">
-        <p14:creationId xmlns:p14="http://schemas.microsoft.com/office/powerpoint/2010/main" val="326125369"/>
+        <p14:creationId xmlns:p14="http://schemas.microsoft.com/office/powerpoint/2010/main" val="2056972119"/>
       </p:ext>
     </p:extLst>
   </p:cSld>
@@ -1827,56 +1827,30 @@
       </p:grpSpPr>
       <p:sp>
         <p:nvSpPr>
-          <p:cNvPr id="3" name="Date Placeholder 2"/>
-          <p:cNvSpPr>
-            <a:spLocks noGrp="1"/>
-          </p:cNvSpPr>
-          <p:nvPr>
-            <p:ph type="dt" sz="half" idx="10"/>
+          <p:cNvPr id="4" name="Footer Placeholder 3"/>
+          <p:cNvSpPr>
+            <a:spLocks noGrp="1"/>
+          </p:cNvSpPr>
+          <p:nvPr>
+            <p:ph type="ftr" sz="quarter" idx="11"/>
           </p:nvPr>
         </p:nvSpPr>
         <p:spPr>
           <a:xfrm>
-            <a:off x="4406051" y="6308727"/>
-            <a:ext cx="1169155" cy="485424"/>
+            <a:off x="1973208" y="6327488"/>
+            <a:ext cx="8605793" cy="487680"/>
           </a:xfrm>
-          <a:prstGeom prst="rect">
-            <a:avLst/>
-          </a:prstGeom>
         </p:spPr>
         <p:txBody>
           <a:bodyPr/>
           <a:lstStyle/>
           <a:p>
-            <a:fld id="{0D99093C-E824-EC48-B77A-280F17DA5D37}" type="datetimeFigureOut">
-              <a:rPr lang="en-US" smtClean="0"/>
-              <a:t>10/23/25</a:t>
-            </a:fld>
             <a:endParaRPr lang="en-US"/>
           </a:p>
         </p:txBody>
       </p:sp>
       <p:sp>
         <p:nvSpPr>
-          <p:cNvPr id="4" name="Footer Placeholder 3"/>
-          <p:cNvSpPr>
-            <a:spLocks noGrp="1"/>
-          </p:cNvSpPr>
-          <p:nvPr>
-            <p:ph type="ftr" sz="quarter" idx="11"/>
-          </p:nvPr>
-        </p:nvSpPr>
-        <p:spPr/>
-        <p:txBody>
-          <a:bodyPr/>
-          <a:lstStyle/>
-          <a:p>
-            <a:endParaRPr lang="en-US"/>
-          </a:p>
-        </p:txBody>
-      </p:sp>
-      <p:sp>
-        <p:nvSpPr>
           <p:cNvPr id="5" name="Slide Number Placeholder 4"/>
           <p:cNvSpPr>
             <a:spLocks noGrp="1"/>
@@ -1885,7 +1859,12 @@
             <p:ph type="sldNum" sz="quarter" idx="12"/>
           </p:nvPr>
         </p:nvSpPr>
-        <p:spPr/>
+        <p:spPr>
+          <a:xfrm>
+            <a:off x="10745942" y="6308726"/>
+            <a:ext cx="879777" cy="487680"/>
+          </a:xfrm>
+        </p:spPr>
         <p:txBody>
           <a:bodyPr/>
           <a:lstStyle/>
@@ -1901,7 +1880,7 @@
     </p:spTree>
     <p:extLst>
       <p:ext uri="{BB962C8B-B14F-4D97-AF65-F5344CB8AC3E}">
-        <p14:creationId xmlns:p14="http://schemas.microsoft.com/office/powerpoint/2010/main" val="2961490640"/>
+        <p14:creationId xmlns:p14="http://schemas.microsoft.com/office/powerpoint/2010/main" val="3752876753"/>
       </p:ext>
     </p:extLst>
   </p:cSld>
@@ -1923,13 +1902,165 @@
 </p:sldLayout>
 </file>
 
+<file path=ppt/slideLayouts/slideLayout8.xml><?xml version="1.0" encoding="utf-8"?>
+<p:sldLayout xmlns:a="http://schemas.openxmlformats.org/drawingml/2006/main" xmlns:r="http://schemas.openxmlformats.org/officeDocument/2006/relationships" xmlns:p="http://schemas.openxmlformats.org/presentationml/2006/main">
+  <p:cSld name="Section">
+    <p:spTree>
+      <p:nvGrpSpPr>
+        <p:cNvPr id="1" name=""/>
+        <p:cNvGrpSpPr/>
+        <p:nvPr/>
+      </p:nvGrpSpPr>
+      <p:grpSpPr>
+        <a:xfrm>
+          <a:off x="0" y="0"/>
+          <a:ext cx="0" cy="0"/>
+          <a:chOff x="0" y="0"/>
+          <a:chExt cx="0" cy="0"/>
+        </a:xfrm>
+      </p:grpSpPr>
+      <p:sp>
+        <p:nvSpPr>
+          <p:cNvPr id="2" name="Title 1">
+            <a:extLst>
+              <a:ext uri="{FF2B5EF4-FFF2-40B4-BE49-F238E27FC236}">
+                <a16:creationId xmlns:a16="http://schemas.microsoft.com/office/drawing/2014/main" id="{4E0B955B-3757-0FEC-8150-652A2829B605}"/>
+              </a:ext>
+            </a:extLst>
+          </p:cNvPr>
+          <p:cNvSpPr>
+            <a:spLocks noGrp="1"/>
+          </p:cNvSpPr>
+          <p:nvPr>
+            <p:ph type="ctrTitle" hasCustomPrompt="1"/>
+          </p:nvPr>
+        </p:nvSpPr>
+        <p:spPr>
+          <a:xfrm>
+            <a:off x="1524000" y="2921168"/>
+            <a:ext cx="9144000" cy="1015663"/>
+          </a:xfrm>
+        </p:spPr>
+        <p:txBody>
+          <a:bodyPr anchor="ctr" anchorCtr="0">
+            <a:spAutoFit/>
+          </a:bodyPr>
+          <a:lstStyle>
+            <a:lvl1pPr algn="ctr">
+              <a:defRPr sz="6000"/>
+            </a:lvl1pPr>
+          </a:lstStyle>
+          <a:p>
+            <a:r>
+              <a:rPr lang="en-US" dirty="0"/>
+              <a:t>Click to edit Section</a:t>
+            </a:r>
+          </a:p>
+        </p:txBody>
+      </p:sp>
+      <p:sp>
+        <p:nvSpPr>
+          <p:cNvPr id="4" name="Date Placeholder 3">
+            <a:extLst>
+              <a:ext uri="{FF2B5EF4-FFF2-40B4-BE49-F238E27FC236}">
+                <a16:creationId xmlns:a16="http://schemas.microsoft.com/office/drawing/2014/main" id="{E6323134-95A2-6423-76C0-9D75A168C984}"/>
+              </a:ext>
+            </a:extLst>
+          </p:cNvPr>
+          <p:cNvSpPr>
+            <a:spLocks noGrp="1"/>
+          </p:cNvSpPr>
+          <p:nvPr>
+            <p:ph type="dt" sz="half" idx="10"/>
+          </p:nvPr>
+        </p:nvSpPr>
+        <p:spPr/>
+        <p:txBody>
+          <a:bodyPr/>
+          <a:lstStyle/>
+          <a:p>
+            <a:fld id="{3EE6C063-FD43-C948-AAEF-3DF3DF19080E}" type="datetime1">
+              <a:rPr lang="en-US" smtClean="0"/>
+              <a:t>10/27/25</a:t>
+            </a:fld>
+            <a:endParaRPr lang="en-US"/>
+          </a:p>
+        </p:txBody>
+      </p:sp>
+      <p:sp>
+        <p:nvSpPr>
+          <p:cNvPr id="5" name="Footer Placeholder 4">
+            <a:extLst>
+              <a:ext uri="{FF2B5EF4-FFF2-40B4-BE49-F238E27FC236}">
+                <a16:creationId xmlns:a16="http://schemas.microsoft.com/office/drawing/2014/main" id="{2419F5F4-E2F3-BFD8-53AA-6A6F195FC68B}"/>
+              </a:ext>
+            </a:extLst>
+          </p:cNvPr>
+          <p:cNvSpPr>
+            <a:spLocks noGrp="1"/>
+          </p:cNvSpPr>
+          <p:nvPr>
+            <p:ph type="ftr" sz="quarter" idx="11"/>
+          </p:nvPr>
+        </p:nvSpPr>
+        <p:spPr/>
+        <p:txBody>
+          <a:bodyPr/>
+          <a:lstStyle/>
+          <a:p>
+            <a:endParaRPr lang="en-US"/>
+          </a:p>
+        </p:txBody>
+      </p:sp>
+      <p:sp>
+        <p:nvSpPr>
+          <p:cNvPr id="6" name="Slide Number Placeholder 5">
+            <a:extLst>
+              <a:ext uri="{FF2B5EF4-FFF2-40B4-BE49-F238E27FC236}">
+                <a16:creationId xmlns:a16="http://schemas.microsoft.com/office/drawing/2014/main" id="{17B90BEB-A9D1-FF29-0E8C-A755B6F9863F}"/>
+              </a:ext>
+            </a:extLst>
+          </p:cNvPr>
+          <p:cNvSpPr>
+            <a:spLocks noGrp="1"/>
+          </p:cNvSpPr>
+          <p:nvPr>
+            <p:ph type="sldNum" sz="quarter" idx="12"/>
+          </p:nvPr>
+        </p:nvSpPr>
+        <p:spPr/>
+        <p:txBody>
+          <a:bodyPr/>
+          <a:lstStyle/>
+          <a:p>
+            <a:fld id="{62CBAC88-EF5B-3148-888C-824478CD1B05}" type="slidenum">
+              <a:rPr lang="en-US" smtClean="0"/>
+              <a:t>‹#›</a:t>
+            </a:fld>
+            <a:endParaRPr lang="en-US"/>
+          </a:p>
+        </p:txBody>
+      </p:sp>
+    </p:spTree>
+    <p:extLst>
+      <p:ext uri="{BB962C8B-B14F-4D97-AF65-F5344CB8AC3E}">
+        <p14:creationId xmlns:p14="http://schemas.microsoft.com/office/powerpoint/2010/main" val="1718599021"/>
+      </p:ext>
+    </p:extLst>
+  </p:cSld>
+  <p:clrMapOvr>
+    <a:masterClrMapping/>
+  </p:clrMapOvr>
+</p:sldLayout>
+</file>
+
 <file path=ppt/slideMasters/slideMaster1.xml><?xml version="1.0" encoding="utf-8"?>
 <p:sldMaster xmlns:a="http://schemas.openxmlformats.org/drawingml/2006/main" xmlns:r="http://schemas.openxmlformats.org/officeDocument/2006/relationships" xmlns:p="http://schemas.openxmlformats.org/presentationml/2006/main">
   <p:cSld>
     <p:bg>
       <p:bgPr>
         <a:blipFill dpi="0" rotWithShape="1">
-          <a:blip>
+          <a:blip r:embed="rId10">
             <a:lum/>
           </a:blip>
           <a:srcRect/>
@@ -2091,8 +2222,8 @@
         </p:nvSpPr>
         <p:spPr>
           <a:xfrm>
-            <a:off x="1596887" y="6309418"/>
-            <a:ext cx="8998226" cy="487680"/>
+            <a:off x="1881808" y="6308726"/>
+            <a:ext cx="8605793" cy="487680"/>
           </a:xfrm>
           <a:prstGeom prst="rect">
             <a:avLst/>
@@ -2132,7 +2263,7 @@
         </p:nvSpPr>
         <p:spPr>
           <a:xfrm>
-            <a:off x="10702624" y="6308727"/>
+            <a:off x="10595113" y="6308726"/>
             <a:ext cx="879777" cy="487680"/>
           </a:xfrm>
           <a:prstGeom prst="rect">
@@ -2148,7 +2279,7 @@
         <p:txBody>
           <a:bodyPr vert="horz" lIns="91440" tIns="45720" rIns="91440" bIns="45720" rtlCol="0" anchor="ctr"/>
           <a:lstStyle>
-            <a:lvl1pPr algn="r">
+            <a:lvl1pPr algn="ctr">
               <a:defRPr sz="1600">
                 <a:solidFill>
                   <a:schemeClr val="tx1">
@@ -2167,22 +2298,70 @@
           </a:p>
         </p:txBody>
       </p:sp>
+      <p:sp>
+        <p:nvSpPr>
+          <p:cNvPr id="4" name="Date Placeholder 2">
+            <a:extLst>
+              <a:ext uri="{FF2B5EF4-FFF2-40B4-BE49-F238E27FC236}">
+                <a16:creationId xmlns:a16="http://schemas.microsoft.com/office/drawing/2014/main" id="{B6740CB2-DC30-5DDB-24B8-219C9C3F5967}"/>
+              </a:ext>
+            </a:extLst>
+          </p:cNvPr>
+          <p:cNvSpPr>
+            <a:spLocks noGrp="1"/>
+          </p:cNvSpPr>
+          <p:nvPr>
+            <p:ph type="dt" sz="half" idx="2"/>
+          </p:nvPr>
+        </p:nvSpPr>
+        <p:spPr>
+          <a:xfrm>
+            <a:off x="605141" y="6308726"/>
+            <a:ext cx="1169155" cy="487680"/>
+          </a:xfrm>
+          <a:prstGeom prst="rect">
+            <a:avLst/>
+          </a:prstGeom>
+          <a:solidFill>
+            <a:schemeClr val="bg1"/>
+          </a:solidFill>
+          <a:effectLst>
+            <a:softEdge rad="63500"/>
+          </a:effectLst>
+        </p:spPr>
+        <p:txBody>
+          <a:bodyPr anchor="ctr" anchorCtr="0"/>
+          <a:lstStyle>
+            <a:lvl1pPr algn="ctr">
+              <a:defRPr sz="1600"/>
+            </a:lvl1pPr>
+          </a:lstStyle>
+          <a:p>
+            <a:fld id="{EDC92DA9-570C-7E44-B877-650D1E024D90}" type="datetime1">
+              <a:rPr lang="en-US" smtClean="0"/>
+              <a:t>10/27/25</a:t>
+            </a:fld>
+            <a:endParaRPr lang="en-US" dirty="0"/>
+          </a:p>
+        </p:txBody>
+      </p:sp>
     </p:spTree>
     <p:extLst>
       <p:ext uri="{BB962C8B-B14F-4D97-AF65-F5344CB8AC3E}">
-        <p14:creationId xmlns:p14="http://schemas.microsoft.com/office/powerpoint/2010/main" val="1366538305"/>
+        <p14:creationId xmlns:p14="http://schemas.microsoft.com/office/powerpoint/2010/main" val="2133950341"/>
       </p:ext>
     </p:extLst>
   </p:cSld>
   <p:clrMap bg1="lt1" tx1="dk1" bg2="lt2" tx2="dk2" accent1="accent1" accent2="accent2" accent3="accent3" accent4="accent4" accent5="accent5" accent6="accent6" hlink="hlink" folHlink="folHlink"/>
   <p:sldLayoutIdLst>
-    <p:sldLayoutId id="2147483661" r:id="rId1"/>
-    <p:sldLayoutId id="2147483662" r:id="rId2"/>
-    <p:sldLayoutId id="2147483663" r:id="rId3"/>
-    <p:sldLayoutId id="2147483664" r:id="rId4"/>
-    <p:sldLayoutId id="2147483665" r:id="rId5"/>
-    <p:sldLayoutId id="2147483666" r:id="rId6"/>
-    <p:sldLayoutId id="2147483667" r:id="rId7"/>
+    <p:sldLayoutId id="2147483669" r:id="rId1"/>
+    <p:sldLayoutId id="2147483670" r:id="rId2"/>
+    <p:sldLayoutId id="2147483671" r:id="rId3"/>
+    <p:sldLayoutId id="2147483672" r:id="rId4"/>
+    <p:sldLayoutId id="2147483673" r:id="rId5"/>
+    <p:sldLayoutId id="2147483674" r:id="rId6"/>
+    <p:sldLayoutId id="2147483675" r:id="rId7"/>
+    <p:sldLayoutId id="2147483676" r:id="rId8"/>
   </p:sldLayoutIdLst>
   <mc:AlternateContent xmlns:mc="http://schemas.openxmlformats.org/markup-compatibility/2006" xmlns:p14="http://schemas.microsoft.com/office/powerpoint/2010/main">
     <mc:Choice Requires="p14">
@@ -2196,6 +2375,7 @@
       </p:transition>
     </mc:Fallback>
   </mc:AlternateContent>
+  <p:hf hdr="0" dt="0"/>
   <p:txStyles>
     <p:titleStyle>
       <a:lvl1pPr algn="ctr" defTabSz="609570" rtl="0" eaLnBrk="1" latinLnBrk="0" hangingPunct="1">
@@ -2674,6 +2854,60 @@
           </a:p>
         </p:txBody>
       </p:sp>
+      <p:sp>
+        <p:nvSpPr>
+          <p:cNvPr id="2" name="Footer Placeholder 1">
+            <a:extLst>
+              <a:ext uri="{FF2B5EF4-FFF2-40B4-BE49-F238E27FC236}">
+                <a16:creationId xmlns:a16="http://schemas.microsoft.com/office/drawing/2014/main" id="{BAE2EDA4-13C8-1C53-3FFB-F42DC701A91D}"/>
+              </a:ext>
+            </a:extLst>
+          </p:cNvPr>
+          <p:cNvSpPr>
+            <a:spLocks noGrp="1"/>
+          </p:cNvSpPr>
+          <p:nvPr>
+            <p:ph type="ftr" sz="quarter" idx="11"/>
+          </p:nvPr>
+        </p:nvSpPr>
+        <p:spPr/>
+        <p:txBody>
+          <a:bodyPr/>
+          <a:lstStyle/>
+          <a:p>
+            <a:endParaRPr lang="en-US"/>
+          </a:p>
+        </p:txBody>
+      </p:sp>
+      <p:sp>
+        <p:nvSpPr>
+          <p:cNvPr id="3" name="Slide Number Placeholder 2">
+            <a:extLst>
+              <a:ext uri="{FF2B5EF4-FFF2-40B4-BE49-F238E27FC236}">
+                <a16:creationId xmlns:a16="http://schemas.microsoft.com/office/drawing/2014/main" id="{7F912FEF-F02F-1A27-4783-2F35173FC5F0}"/>
+              </a:ext>
+            </a:extLst>
+          </p:cNvPr>
+          <p:cNvSpPr>
+            <a:spLocks noGrp="1"/>
+          </p:cNvSpPr>
+          <p:nvPr>
+            <p:ph type="sldNum" sz="quarter" idx="12"/>
+          </p:nvPr>
+        </p:nvSpPr>
+        <p:spPr/>
+        <p:txBody>
+          <a:bodyPr/>
+          <a:lstStyle/>
+          <a:p>
+            <a:fld id="{62CBAC88-EF5B-3148-888C-824478CD1B05}" type="slidenum">
+              <a:rPr lang="en-US" smtClean="0"/>
+              <a:t>10</a:t>
+            </a:fld>
+            <a:endParaRPr lang="en-US"/>
+          </a:p>
+        </p:txBody>
+      </p:sp>
     </p:spTree>
     <p:extLst>
       <p:ext uri="{BB962C8B-B14F-4D97-AF65-F5344CB8AC3E}">
@@ -2816,6 +3050,60 @@
           </a:p>
         </p:txBody>
       </p:sp>
+      <p:sp>
+        <p:nvSpPr>
+          <p:cNvPr id="4" name="Footer Placeholder 3">
+            <a:extLst>
+              <a:ext uri="{FF2B5EF4-FFF2-40B4-BE49-F238E27FC236}">
+                <a16:creationId xmlns:a16="http://schemas.microsoft.com/office/drawing/2014/main" id="{2E1B3122-2BE3-076A-DEBA-635634874C6F}"/>
+              </a:ext>
+            </a:extLst>
+          </p:cNvPr>
+          <p:cNvSpPr>
+            <a:spLocks noGrp="1"/>
+          </p:cNvSpPr>
+          <p:nvPr>
+            <p:ph type="ftr" sz="quarter" idx="11"/>
+          </p:nvPr>
+        </p:nvSpPr>
+        <p:spPr/>
+        <p:txBody>
+          <a:bodyPr/>
+          <a:lstStyle/>
+          <a:p>
+            <a:endParaRPr lang="en-US"/>
+          </a:p>
+        </p:txBody>
+      </p:sp>
+      <p:sp>
+        <p:nvSpPr>
+          <p:cNvPr id="5" name="Slide Number Placeholder 4">
+            <a:extLst>
+              <a:ext uri="{FF2B5EF4-FFF2-40B4-BE49-F238E27FC236}">
+                <a16:creationId xmlns:a16="http://schemas.microsoft.com/office/drawing/2014/main" id="{65AD984F-A2B9-DFB1-5B8F-01C396441B86}"/>
+              </a:ext>
+            </a:extLst>
+          </p:cNvPr>
+          <p:cNvSpPr>
+            <a:spLocks noGrp="1"/>
+          </p:cNvSpPr>
+          <p:nvPr>
+            <p:ph type="sldNum" sz="quarter" idx="12"/>
+          </p:nvPr>
+        </p:nvSpPr>
+        <p:spPr/>
+        <p:txBody>
+          <a:bodyPr/>
+          <a:lstStyle/>
+          <a:p>
+            <a:fld id="{62CBAC88-EF5B-3148-888C-824478CD1B05}" type="slidenum">
+              <a:rPr lang="en-US" smtClean="0"/>
+              <a:t>11</a:t>
+            </a:fld>
+            <a:endParaRPr lang="en-US"/>
+          </a:p>
+        </p:txBody>
+      </p:sp>
     </p:spTree>
     <p:extLst>
       <p:ext uri="{BB962C8B-B14F-4D97-AF65-F5344CB8AC3E}">
@@ -2991,6 +3279,60 @@
           </a:p>
         </p:txBody>
       </p:sp>
+      <p:sp>
+        <p:nvSpPr>
+          <p:cNvPr id="4" name="Footer Placeholder 3">
+            <a:extLst>
+              <a:ext uri="{FF2B5EF4-FFF2-40B4-BE49-F238E27FC236}">
+                <a16:creationId xmlns:a16="http://schemas.microsoft.com/office/drawing/2014/main" id="{4DE4B210-1AB6-EA23-E8BB-B5267F6F17E1}"/>
+              </a:ext>
+            </a:extLst>
+          </p:cNvPr>
+          <p:cNvSpPr>
+            <a:spLocks noGrp="1"/>
+          </p:cNvSpPr>
+          <p:nvPr>
+            <p:ph type="ftr" sz="quarter" idx="11"/>
+          </p:nvPr>
+        </p:nvSpPr>
+        <p:spPr/>
+        <p:txBody>
+          <a:bodyPr/>
+          <a:lstStyle/>
+          <a:p>
+            <a:endParaRPr lang="en-US"/>
+          </a:p>
+        </p:txBody>
+      </p:sp>
+      <p:sp>
+        <p:nvSpPr>
+          <p:cNvPr id="5" name="Slide Number Placeholder 4">
+            <a:extLst>
+              <a:ext uri="{FF2B5EF4-FFF2-40B4-BE49-F238E27FC236}">
+                <a16:creationId xmlns:a16="http://schemas.microsoft.com/office/drawing/2014/main" id="{695823B2-FAA6-F26A-CE80-C456F9F7ECA4}"/>
+              </a:ext>
+            </a:extLst>
+          </p:cNvPr>
+          <p:cNvSpPr>
+            <a:spLocks noGrp="1"/>
+          </p:cNvSpPr>
+          <p:nvPr>
+            <p:ph type="sldNum" sz="quarter" idx="12"/>
+          </p:nvPr>
+        </p:nvSpPr>
+        <p:spPr/>
+        <p:txBody>
+          <a:bodyPr/>
+          <a:lstStyle/>
+          <a:p>
+            <a:fld id="{62CBAC88-EF5B-3148-888C-824478CD1B05}" type="slidenum">
+              <a:rPr lang="en-US" smtClean="0"/>
+              <a:t>12</a:t>
+            </a:fld>
+            <a:endParaRPr lang="en-US"/>
+          </a:p>
+        </p:txBody>
+      </p:sp>
     </p:spTree>
     <p:extLst>
       <p:ext uri="{BB962C8B-B14F-4D97-AF65-F5344CB8AC3E}">
@@ -3121,6 +3463,60 @@
           </a:p>
         </p:txBody>
       </p:sp>
+      <p:sp>
+        <p:nvSpPr>
+          <p:cNvPr id="4" name="Footer Placeholder 3">
+            <a:extLst>
+              <a:ext uri="{FF2B5EF4-FFF2-40B4-BE49-F238E27FC236}">
+                <a16:creationId xmlns:a16="http://schemas.microsoft.com/office/drawing/2014/main" id="{1D37FF65-703F-9DB7-B886-0EB432921604}"/>
+              </a:ext>
+            </a:extLst>
+          </p:cNvPr>
+          <p:cNvSpPr>
+            <a:spLocks noGrp="1"/>
+          </p:cNvSpPr>
+          <p:nvPr>
+            <p:ph type="ftr" sz="quarter" idx="11"/>
+          </p:nvPr>
+        </p:nvSpPr>
+        <p:spPr/>
+        <p:txBody>
+          <a:bodyPr/>
+          <a:lstStyle/>
+          <a:p>
+            <a:endParaRPr lang="en-US"/>
+          </a:p>
+        </p:txBody>
+      </p:sp>
+      <p:sp>
+        <p:nvSpPr>
+          <p:cNvPr id="5" name="Slide Number Placeholder 4">
+            <a:extLst>
+              <a:ext uri="{FF2B5EF4-FFF2-40B4-BE49-F238E27FC236}">
+                <a16:creationId xmlns:a16="http://schemas.microsoft.com/office/drawing/2014/main" id="{6B19EDB4-90C1-23DC-744A-6D6666A96E88}"/>
+              </a:ext>
+            </a:extLst>
+          </p:cNvPr>
+          <p:cNvSpPr>
+            <a:spLocks noGrp="1"/>
+          </p:cNvSpPr>
+          <p:nvPr>
+            <p:ph type="sldNum" sz="quarter" idx="12"/>
+          </p:nvPr>
+        </p:nvSpPr>
+        <p:spPr/>
+        <p:txBody>
+          <a:bodyPr/>
+          <a:lstStyle/>
+          <a:p>
+            <a:fld id="{62CBAC88-EF5B-3148-888C-824478CD1B05}" type="slidenum">
+              <a:rPr lang="en-US" smtClean="0"/>
+              <a:t>13</a:t>
+            </a:fld>
+            <a:endParaRPr lang="en-US"/>
+          </a:p>
+        </p:txBody>
+      </p:sp>
     </p:spTree>
     <p:extLst>
       <p:ext uri="{BB962C8B-B14F-4D97-AF65-F5344CB8AC3E}">
@@ -3300,6 +3696,60 @@
           </a:p>
         </p:txBody>
       </p:sp>
+      <p:sp>
+        <p:nvSpPr>
+          <p:cNvPr id="4" name="Footer Placeholder 3">
+            <a:extLst>
+              <a:ext uri="{FF2B5EF4-FFF2-40B4-BE49-F238E27FC236}">
+                <a16:creationId xmlns:a16="http://schemas.microsoft.com/office/drawing/2014/main" id="{8EC78637-8A69-C509-2346-31E734FB9172}"/>
+              </a:ext>
+            </a:extLst>
+          </p:cNvPr>
+          <p:cNvSpPr>
+            <a:spLocks noGrp="1"/>
+          </p:cNvSpPr>
+          <p:nvPr>
+            <p:ph type="ftr" sz="quarter" idx="11"/>
+          </p:nvPr>
+        </p:nvSpPr>
+        <p:spPr/>
+        <p:txBody>
+          <a:bodyPr/>
+          <a:lstStyle/>
+          <a:p>
+            <a:endParaRPr lang="en-US"/>
+          </a:p>
+        </p:txBody>
+      </p:sp>
+      <p:sp>
+        <p:nvSpPr>
+          <p:cNvPr id="5" name="Slide Number Placeholder 4">
+            <a:extLst>
+              <a:ext uri="{FF2B5EF4-FFF2-40B4-BE49-F238E27FC236}">
+                <a16:creationId xmlns:a16="http://schemas.microsoft.com/office/drawing/2014/main" id="{706B16D4-6EAD-FD8D-E007-A31A418F4078}"/>
+              </a:ext>
+            </a:extLst>
+          </p:cNvPr>
+          <p:cNvSpPr>
+            <a:spLocks noGrp="1"/>
+          </p:cNvSpPr>
+          <p:nvPr>
+            <p:ph type="sldNum" sz="quarter" idx="12"/>
+          </p:nvPr>
+        </p:nvSpPr>
+        <p:spPr/>
+        <p:txBody>
+          <a:bodyPr/>
+          <a:lstStyle/>
+          <a:p>
+            <a:fld id="{62CBAC88-EF5B-3148-888C-824478CD1B05}" type="slidenum">
+              <a:rPr lang="en-US" smtClean="0"/>
+              <a:t>14</a:t>
+            </a:fld>
+            <a:endParaRPr lang="en-US"/>
+          </a:p>
+        </p:txBody>
+      </p:sp>
     </p:spTree>
     <p:extLst>
       <p:ext uri="{BB962C8B-B14F-4D97-AF65-F5344CB8AC3E}">
@@ -3443,6 +3893,60 @@
           </a:p>
         </p:txBody>
       </p:sp>
+      <p:sp>
+        <p:nvSpPr>
+          <p:cNvPr id="4" name="Footer Placeholder 3">
+            <a:extLst>
+              <a:ext uri="{FF2B5EF4-FFF2-40B4-BE49-F238E27FC236}">
+                <a16:creationId xmlns:a16="http://schemas.microsoft.com/office/drawing/2014/main" id="{6D81252D-71B2-CDD5-1C61-55D6B65FA4CA}"/>
+              </a:ext>
+            </a:extLst>
+          </p:cNvPr>
+          <p:cNvSpPr>
+            <a:spLocks noGrp="1"/>
+          </p:cNvSpPr>
+          <p:nvPr>
+            <p:ph type="ftr" sz="quarter" idx="11"/>
+          </p:nvPr>
+        </p:nvSpPr>
+        <p:spPr/>
+        <p:txBody>
+          <a:bodyPr/>
+          <a:lstStyle/>
+          <a:p>
+            <a:endParaRPr lang="en-US"/>
+          </a:p>
+        </p:txBody>
+      </p:sp>
+      <p:sp>
+        <p:nvSpPr>
+          <p:cNvPr id="5" name="Slide Number Placeholder 4">
+            <a:extLst>
+              <a:ext uri="{FF2B5EF4-FFF2-40B4-BE49-F238E27FC236}">
+                <a16:creationId xmlns:a16="http://schemas.microsoft.com/office/drawing/2014/main" id="{18A615C3-25F8-C220-128E-D9EDFEB2DB7D}"/>
+              </a:ext>
+            </a:extLst>
+          </p:cNvPr>
+          <p:cNvSpPr>
+            <a:spLocks noGrp="1"/>
+          </p:cNvSpPr>
+          <p:nvPr>
+            <p:ph type="sldNum" sz="quarter" idx="12"/>
+          </p:nvPr>
+        </p:nvSpPr>
+        <p:spPr/>
+        <p:txBody>
+          <a:bodyPr/>
+          <a:lstStyle/>
+          <a:p>
+            <a:fld id="{62CBAC88-EF5B-3148-888C-824478CD1B05}" type="slidenum">
+              <a:rPr lang="en-US" smtClean="0"/>
+              <a:t>15</a:t>
+            </a:fld>
+            <a:endParaRPr lang="en-US"/>
+          </a:p>
+        </p:txBody>
+      </p:sp>
     </p:spTree>
     <p:extLst>
       <p:ext uri="{BB962C8B-B14F-4D97-AF65-F5344CB8AC3E}">
@@ -3584,6 +4088,60 @@
           </a:p>
         </p:txBody>
       </p:sp>
+      <p:sp>
+        <p:nvSpPr>
+          <p:cNvPr id="4" name="Footer Placeholder 3">
+            <a:extLst>
+              <a:ext uri="{FF2B5EF4-FFF2-40B4-BE49-F238E27FC236}">
+                <a16:creationId xmlns:a16="http://schemas.microsoft.com/office/drawing/2014/main" id="{3F3B9BEB-8BCC-DE81-6323-48FE6B4428DB}"/>
+              </a:ext>
+            </a:extLst>
+          </p:cNvPr>
+          <p:cNvSpPr>
+            <a:spLocks noGrp="1"/>
+          </p:cNvSpPr>
+          <p:nvPr>
+            <p:ph type="ftr" sz="quarter" idx="11"/>
+          </p:nvPr>
+        </p:nvSpPr>
+        <p:spPr/>
+        <p:txBody>
+          <a:bodyPr/>
+          <a:lstStyle/>
+          <a:p>
+            <a:endParaRPr lang="en-US"/>
+          </a:p>
+        </p:txBody>
+      </p:sp>
+      <p:sp>
+        <p:nvSpPr>
+          <p:cNvPr id="5" name="Slide Number Placeholder 4">
+            <a:extLst>
+              <a:ext uri="{FF2B5EF4-FFF2-40B4-BE49-F238E27FC236}">
+                <a16:creationId xmlns:a16="http://schemas.microsoft.com/office/drawing/2014/main" id="{946AD722-555A-1516-4D7F-09C5244BC60E}"/>
+              </a:ext>
+            </a:extLst>
+          </p:cNvPr>
+          <p:cNvSpPr>
+            <a:spLocks noGrp="1"/>
+          </p:cNvSpPr>
+          <p:nvPr>
+            <p:ph type="sldNum" sz="quarter" idx="12"/>
+          </p:nvPr>
+        </p:nvSpPr>
+        <p:spPr/>
+        <p:txBody>
+          <a:bodyPr/>
+          <a:lstStyle/>
+          <a:p>
+            <a:fld id="{62CBAC88-EF5B-3148-888C-824478CD1B05}" type="slidenum">
+              <a:rPr lang="en-US" smtClean="0"/>
+              <a:t>16</a:t>
+            </a:fld>
+            <a:endParaRPr lang="en-US"/>
+          </a:p>
+        </p:txBody>
+      </p:sp>
     </p:spTree>
     <p:extLst>
       <p:ext uri="{BB962C8B-B14F-4D97-AF65-F5344CB8AC3E}">
@@ -3742,6 +4300,60 @@
           </a:p>
         </p:txBody>
       </p:sp>
+      <p:sp>
+        <p:nvSpPr>
+          <p:cNvPr id="4" name="Footer Placeholder 3">
+            <a:extLst>
+              <a:ext uri="{FF2B5EF4-FFF2-40B4-BE49-F238E27FC236}">
+                <a16:creationId xmlns:a16="http://schemas.microsoft.com/office/drawing/2014/main" id="{025939F2-138B-45BD-EC79-7182ABD06F39}"/>
+              </a:ext>
+            </a:extLst>
+          </p:cNvPr>
+          <p:cNvSpPr>
+            <a:spLocks noGrp="1"/>
+          </p:cNvSpPr>
+          <p:nvPr>
+            <p:ph type="ftr" sz="quarter" idx="11"/>
+          </p:nvPr>
+        </p:nvSpPr>
+        <p:spPr/>
+        <p:txBody>
+          <a:bodyPr/>
+          <a:lstStyle/>
+          <a:p>
+            <a:endParaRPr lang="en-US"/>
+          </a:p>
+        </p:txBody>
+      </p:sp>
+      <p:sp>
+        <p:nvSpPr>
+          <p:cNvPr id="5" name="Slide Number Placeholder 4">
+            <a:extLst>
+              <a:ext uri="{FF2B5EF4-FFF2-40B4-BE49-F238E27FC236}">
+                <a16:creationId xmlns:a16="http://schemas.microsoft.com/office/drawing/2014/main" id="{869955AB-1CD3-44E8-CC10-EFB2D222D087}"/>
+              </a:ext>
+            </a:extLst>
+          </p:cNvPr>
+          <p:cNvSpPr>
+            <a:spLocks noGrp="1"/>
+          </p:cNvSpPr>
+          <p:nvPr>
+            <p:ph type="sldNum" sz="quarter" idx="12"/>
+          </p:nvPr>
+        </p:nvSpPr>
+        <p:spPr/>
+        <p:txBody>
+          <a:bodyPr/>
+          <a:lstStyle/>
+          <a:p>
+            <a:fld id="{62CBAC88-EF5B-3148-888C-824478CD1B05}" type="slidenum">
+              <a:rPr lang="en-US" smtClean="0"/>
+              <a:t>17</a:t>
+            </a:fld>
+            <a:endParaRPr lang="en-US"/>
+          </a:p>
+        </p:txBody>
+      </p:sp>
     </p:spTree>
     <p:extLst>
       <p:ext uri="{BB962C8B-B14F-4D97-AF65-F5344CB8AC3E}">
@@ -3871,6 +4483,60 @@
           </a:p>
         </p:txBody>
       </p:sp>
+      <p:sp>
+        <p:nvSpPr>
+          <p:cNvPr id="2" name="Footer Placeholder 1">
+            <a:extLst>
+              <a:ext uri="{FF2B5EF4-FFF2-40B4-BE49-F238E27FC236}">
+                <a16:creationId xmlns:a16="http://schemas.microsoft.com/office/drawing/2014/main" id="{B54642EB-EB67-6C91-81B3-F009661B01AD}"/>
+              </a:ext>
+            </a:extLst>
+          </p:cNvPr>
+          <p:cNvSpPr>
+            <a:spLocks noGrp="1"/>
+          </p:cNvSpPr>
+          <p:nvPr>
+            <p:ph type="ftr" sz="quarter" idx="11"/>
+          </p:nvPr>
+        </p:nvSpPr>
+        <p:spPr/>
+        <p:txBody>
+          <a:bodyPr/>
+          <a:lstStyle/>
+          <a:p>
+            <a:endParaRPr lang="en-US"/>
+          </a:p>
+        </p:txBody>
+      </p:sp>
+      <p:sp>
+        <p:nvSpPr>
+          <p:cNvPr id="5" name="Slide Number Placeholder 4">
+            <a:extLst>
+              <a:ext uri="{FF2B5EF4-FFF2-40B4-BE49-F238E27FC236}">
+                <a16:creationId xmlns:a16="http://schemas.microsoft.com/office/drawing/2014/main" id="{D8186AA4-6BCD-C8FC-0AF8-8817DF5C82E8}"/>
+              </a:ext>
+            </a:extLst>
+          </p:cNvPr>
+          <p:cNvSpPr>
+            <a:spLocks noGrp="1"/>
+          </p:cNvSpPr>
+          <p:nvPr>
+            <p:ph type="sldNum" sz="quarter" idx="12"/>
+          </p:nvPr>
+        </p:nvSpPr>
+        <p:spPr/>
+        <p:txBody>
+          <a:bodyPr/>
+          <a:lstStyle/>
+          <a:p>
+            <a:fld id="{62CBAC88-EF5B-3148-888C-824478CD1B05}" type="slidenum">
+              <a:rPr lang="en-US" smtClean="0"/>
+              <a:t>18</a:t>
+            </a:fld>
+            <a:endParaRPr lang="en-US"/>
+          </a:p>
+        </p:txBody>
+      </p:sp>
     </p:spTree>
     <p:extLst>
       <p:ext uri="{BB962C8B-B14F-4D97-AF65-F5344CB8AC3E}">
@@ -3987,6 +4653,60 @@
           </a:p>
         </p:txBody>
       </p:sp>
+      <p:sp>
+        <p:nvSpPr>
+          <p:cNvPr id="2" name="Footer Placeholder 1">
+            <a:extLst>
+              <a:ext uri="{FF2B5EF4-FFF2-40B4-BE49-F238E27FC236}">
+                <a16:creationId xmlns:a16="http://schemas.microsoft.com/office/drawing/2014/main" id="{BF3B5F0F-E1A4-494E-F5CB-4F75ABC07C37}"/>
+              </a:ext>
+            </a:extLst>
+          </p:cNvPr>
+          <p:cNvSpPr>
+            <a:spLocks noGrp="1"/>
+          </p:cNvSpPr>
+          <p:nvPr>
+            <p:ph type="ftr" sz="quarter" idx="11"/>
+          </p:nvPr>
+        </p:nvSpPr>
+        <p:spPr/>
+        <p:txBody>
+          <a:bodyPr/>
+          <a:lstStyle/>
+          <a:p>
+            <a:endParaRPr lang="en-US"/>
+          </a:p>
+        </p:txBody>
+      </p:sp>
+      <p:sp>
+        <p:nvSpPr>
+          <p:cNvPr id="5" name="Slide Number Placeholder 4">
+            <a:extLst>
+              <a:ext uri="{FF2B5EF4-FFF2-40B4-BE49-F238E27FC236}">
+                <a16:creationId xmlns:a16="http://schemas.microsoft.com/office/drawing/2014/main" id="{9569854A-FFC6-23F9-9CC5-D9670BB66B97}"/>
+              </a:ext>
+            </a:extLst>
+          </p:cNvPr>
+          <p:cNvSpPr>
+            <a:spLocks noGrp="1"/>
+          </p:cNvSpPr>
+          <p:nvPr>
+            <p:ph type="sldNum" sz="quarter" idx="12"/>
+          </p:nvPr>
+        </p:nvSpPr>
+        <p:spPr/>
+        <p:txBody>
+          <a:bodyPr/>
+          <a:lstStyle/>
+          <a:p>
+            <a:fld id="{62CBAC88-EF5B-3148-888C-824478CD1B05}" type="slidenum">
+              <a:rPr lang="en-US" smtClean="0"/>
+              <a:t>19</a:t>
+            </a:fld>
+            <a:endParaRPr lang="en-US"/>
+          </a:p>
+        </p:txBody>
+      </p:sp>
     </p:spTree>
     <p:extLst>
       <p:ext uri="{BB962C8B-B14F-4D97-AF65-F5344CB8AC3E}">
@@ -4085,6 +4805,60 @@
           </a:p>
         </p:txBody>
       </p:sp>
+      <p:sp>
+        <p:nvSpPr>
+          <p:cNvPr id="4" name="Footer Placeholder 3">
+            <a:extLst>
+              <a:ext uri="{FF2B5EF4-FFF2-40B4-BE49-F238E27FC236}">
+                <a16:creationId xmlns:a16="http://schemas.microsoft.com/office/drawing/2014/main" id="{54DCD0AD-D003-55AA-A765-638E851BA07C}"/>
+              </a:ext>
+            </a:extLst>
+          </p:cNvPr>
+          <p:cNvSpPr>
+            <a:spLocks noGrp="1"/>
+          </p:cNvSpPr>
+          <p:nvPr>
+            <p:ph type="ftr" sz="quarter" idx="11"/>
+          </p:nvPr>
+        </p:nvSpPr>
+        <p:spPr/>
+        <p:txBody>
+          <a:bodyPr/>
+          <a:lstStyle/>
+          <a:p>
+            <a:endParaRPr lang="en-US"/>
+          </a:p>
+        </p:txBody>
+      </p:sp>
+      <p:sp>
+        <p:nvSpPr>
+          <p:cNvPr id="5" name="Slide Number Placeholder 4">
+            <a:extLst>
+              <a:ext uri="{FF2B5EF4-FFF2-40B4-BE49-F238E27FC236}">
+                <a16:creationId xmlns:a16="http://schemas.microsoft.com/office/drawing/2014/main" id="{3AA58EA0-EBB5-DDBC-5FD8-C76E8EBDAA80}"/>
+              </a:ext>
+            </a:extLst>
+          </p:cNvPr>
+          <p:cNvSpPr>
+            <a:spLocks noGrp="1"/>
+          </p:cNvSpPr>
+          <p:nvPr>
+            <p:ph type="sldNum" sz="quarter" idx="12"/>
+          </p:nvPr>
+        </p:nvSpPr>
+        <p:spPr/>
+        <p:txBody>
+          <a:bodyPr/>
+          <a:lstStyle/>
+          <a:p>
+            <a:fld id="{62CBAC88-EF5B-3148-888C-824478CD1B05}" type="slidenum">
+              <a:rPr lang="en-US" smtClean="0"/>
+              <a:t>2</a:t>
+            </a:fld>
+            <a:endParaRPr lang="en-US"/>
+          </a:p>
+        </p:txBody>
+      </p:sp>
     </p:spTree>
     <p:extLst>
       <p:ext uri="{BB962C8B-B14F-4D97-AF65-F5344CB8AC3E}">
@@ -4301,6 +5075,60 @@
           </a:p>
         </p:txBody>
       </p:sp>
+      <p:sp>
+        <p:nvSpPr>
+          <p:cNvPr id="4" name="Footer Placeholder 3">
+            <a:extLst>
+              <a:ext uri="{FF2B5EF4-FFF2-40B4-BE49-F238E27FC236}">
+                <a16:creationId xmlns:a16="http://schemas.microsoft.com/office/drawing/2014/main" id="{D0C53DCD-91C5-79B1-4D99-26F98600E954}"/>
+              </a:ext>
+            </a:extLst>
+          </p:cNvPr>
+          <p:cNvSpPr>
+            <a:spLocks noGrp="1"/>
+          </p:cNvSpPr>
+          <p:nvPr>
+            <p:ph type="ftr" sz="quarter" idx="11"/>
+          </p:nvPr>
+        </p:nvSpPr>
+        <p:spPr/>
+        <p:txBody>
+          <a:bodyPr/>
+          <a:lstStyle/>
+          <a:p>
+            <a:endParaRPr lang="en-US"/>
+          </a:p>
+        </p:txBody>
+      </p:sp>
+      <p:sp>
+        <p:nvSpPr>
+          <p:cNvPr id="5" name="Slide Number Placeholder 4">
+            <a:extLst>
+              <a:ext uri="{FF2B5EF4-FFF2-40B4-BE49-F238E27FC236}">
+                <a16:creationId xmlns:a16="http://schemas.microsoft.com/office/drawing/2014/main" id="{53CCA931-2599-3391-996D-5BB68535025B}"/>
+              </a:ext>
+            </a:extLst>
+          </p:cNvPr>
+          <p:cNvSpPr>
+            <a:spLocks noGrp="1"/>
+          </p:cNvSpPr>
+          <p:nvPr>
+            <p:ph type="sldNum" sz="quarter" idx="12"/>
+          </p:nvPr>
+        </p:nvSpPr>
+        <p:spPr/>
+        <p:txBody>
+          <a:bodyPr/>
+          <a:lstStyle/>
+          <a:p>
+            <a:fld id="{62CBAC88-EF5B-3148-888C-824478CD1B05}" type="slidenum">
+              <a:rPr lang="en-US" smtClean="0"/>
+              <a:t>20</a:t>
+            </a:fld>
+            <a:endParaRPr lang="en-US"/>
+          </a:p>
+        </p:txBody>
+      </p:sp>
     </p:spTree>
     <p:extLst>
       <p:ext uri="{BB962C8B-B14F-4D97-AF65-F5344CB8AC3E}">
@@ -4464,6 +5292,60 @@
           </a:p>
         </p:txBody>
       </p:sp>
+      <p:sp>
+        <p:nvSpPr>
+          <p:cNvPr id="4" name="Footer Placeholder 3">
+            <a:extLst>
+              <a:ext uri="{FF2B5EF4-FFF2-40B4-BE49-F238E27FC236}">
+                <a16:creationId xmlns:a16="http://schemas.microsoft.com/office/drawing/2014/main" id="{7BE3B76E-3282-64EA-4FF6-842F70AE14A4}"/>
+              </a:ext>
+            </a:extLst>
+          </p:cNvPr>
+          <p:cNvSpPr>
+            <a:spLocks noGrp="1"/>
+          </p:cNvSpPr>
+          <p:nvPr>
+            <p:ph type="ftr" sz="quarter" idx="11"/>
+          </p:nvPr>
+        </p:nvSpPr>
+        <p:spPr/>
+        <p:txBody>
+          <a:bodyPr/>
+          <a:lstStyle/>
+          <a:p>
+            <a:endParaRPr lang="en-US"/>
+          </a:p>
+        </p:txBody>
+      </p:sp>
+      <p:sp>
+        <p:nvSpPr>
+          <p:cNvPr id="5" name="Slide Number Placeholder 4">
+            <a:extLst>
+              <a:ext uri="{FF2B5EF4-FFF2-40B4-BE49-F238E27FC236}">
+                <a16:creationId xmlns:a16="http://schemas.microsoft.com/office/drawing/2014/main" id="{2932B237-606C-1367-6E10-95AB3BD6892A}"/>
+              </a:ext>
+            </a:extLst>
+          </p:cNvPr>
+          <p:cNvSpPr>
+            <a:spLocks noGrp="1"/>
+          </p:cNvSpPr>
+          <p:nvPr>
+            <p:ph type="sldNum" sz="quarter" idx="12"/>
+          </p:nvPr>
+        </p:nvSpPr>
+        <p:spPr/>
+        <p:txBody>
+          <a:bodyPr/>
+          <a:lstStyle/>
+          <a:p>
+            <a:fld id="{62CBAC88-EF5B-3148-888C-824478CD1B05}" type="slidenum">
+              <a:rPr lang="en-US" smtClean="0"/>
+              <a:t>21</a:t>
+            </a:fld>
+            <a:endParaRPr lang="en-US"/>
+          </a:p>
+        </p:txBody>
+      </p:sp>
     </p:spTree>
     <p:extLst>
       <p:ext uri="{BB962C8B-B14F-4D97-AF65-F5344CB8AC3E}">
@@ -4655,6 +5537,60 @@
           </a:p>
         </p:txBody>
       </p:sp>
+      <p:sp>
+        <p:nvSpPr>
+          <p:cNvPr id="4" name="Footer Placeholder 3">
+            <a:extLst>
+              <a:ext uri="{FF2B5EF4-FFF2-40B4-BE49-F238E27FC236}">
+                <a16:creationId xmlns:a16="http://schemas.microsoft.com/office/drawing/2014/main" id="{5F85CA17-693C-80EF-FCFD-365762639B19}"/>
+              </a:ext>
+            </a:extLst>
+          </p:cNvPr>
+          <p:cNvSpPr>
+            <a:spLocks noGrp="1"/>
+          </p:cNvSpPr>
+          <p:nvPr>
+            <p:ph type="ftr" sz="quarter" idx="11"/>
+          </p:nvPr>
+        </p:nvSpPr>
+        <p:spPr/>
+        <p:txBody>
+          <a:bodyPr/>
+          <a:lstStyle/>
+          <a:p>
+            <a:endParaRPr lang="en-US"/>
+          </a:p>
+        </p:txBody>
+      </p:sp>
+      <p:sp>
+        <p:nvSpPr>
+          <p:cNvPr id="5" name="Slide Number Placeholder 4">
+            <a:extLst>
+              <a:ext uri="{FF2B5EF4-FFF2-40B4-BE49-F238E27FC236}">
+                <a16:creationId xmlns:a16="http://schemas.microsoft.com/office/drawing/2014/main" id="{79B6D990-6135-BB69-1815-6FB5EA5B4B68}"/>
+              </a:ext>
+            </a:extLst>
+          </p:cNvPr>
+          <p:cNvSpPr>
+            <a:spLocks noGrp="1"/>
+          </p:cNvSpPr>
+          <p:nvPr>
+            <p:ph type="sldNum" sz="quarter" idx="12"/>
+          </p:nvPr>
+        </p:nvSpPr>
+        <p:spPr/>
+        <p:txBody>
+          <a:bodyPr/>
+          <a:lstStyle/>
+          <a:p>
+            <a:fld id="{62CBAC88-EF5B-3148-888C-824478CD1B05}" type="slidenum">
+              <a:rPr lang="en-US" smtClean="0"/>
+              <a:t>22</a:t>
+            </a:fld>
+            <a:endParaRPr lang="en-US"/>
+          </a:p>
+        </p:txBody>
+      </p:sp>
     </p:spTree>
     <p:extLst>
       <p:ext uri="{BB962C8B-B14F-4D97-AF65-F5344CB8AC3E}">
@@ -4954,6 +5890,60 @@
           </a:p>
         </p:txBody>
       </p:sp>
+      <p:sp>
+        <p:nvSpPr>
+          <p:cNvPr id="4" name="Footer Placeholder 3">
+            <a:extLst>
+              <a:ext uri="{FF2B5EF4-FFF2-40B4-BE49-F238E27FC236}">
+                <a16:creationId xmlns:a16="http://schemas.microsoft.com/office/drawing/2014/main" id="{31A00E45-5FDB-765B-DFF9-45FCA806BB1C}"/>
+              </a:ext>
+            </a:extLst>
+          </p:cNvPr>
+          <p:cNvSpPr>
+            <a:spLocks noGrp="1"/>
+          </p:cNvSpPr>
+          <p:nvPr>
+            <p:ph type="ftr" sz="quarter" idx="11"/>
+          </p:nvPr>
+        </p:nvSpPr>
+        <p:spPr/>
+        <p:txBody>
+          <a:bodyPr/>
+          <a:lstStyle/>
+          <a:p>
+            <a:endParaRPr lang="en-US"/>
+          </a:p>
+        </p:txBody>
+      </p:sp>
+      <p:sp>
+        <p:nvSpPr>
+          <p:cNvPr id="5" name="Slide Number Placeholder 4">
+            <a:extLst>
+              <a:ext uri="{FF2B5EF4-FFF2-40B4-BE49-F238E27FC236}">
+                <a16:creationId xmlns:a16="http://schemas.microsoft.com/office/drawing/2014/main" id="{E9872A28-ED66-E875-44EE-2F21B72AE1EA}"/>
+              </a:ext>
+            </a:extLst>
+          </p:cNvPr>
+          <p:cNvSpPr>
+            <a:spLocks noGrp="1"/>
+          </p:cNvSpPr>
+          <p:nvPr>
+            <p:ph type="sldNum" sz="quarter" idx="12"/>
+          </p:nvPr>
+        </p:nvSpPr>
+        <p:spPr/>
+        <p:txBody>
+          <a:bodyPr/>
+          <a:lstStyle/>
+          <a:p>
+            <a:fld id="{62CBAC88-EF5B-3148-888C-824478CD1B05}" type="slidenum">
+              <a:rPr lang="en-US" smtClean="0"/>
+              <a:t>23</a:t>
+            </a:fld>
+            <a:endParaRPr lang="en-US"/>
+          </a:p>
+        </p:txBody>
+      </p:sp>
     </p:spTree>
     <p:extLst>
       <p:ext uri="{BB962C8B-B14F-4D97-AF65-F5344CB8AC3E}">
@@ -5100,6 +6090,60 @@
           </a:p>
           <a:p>
             <a:endParaRPr lang="en-US" dirty="0"/>
+          </a:p>
+        </p:txBody>
+      </p:sp>
+      <p:sp>
+        <p:nvSpPr>
+          <p:cNvPr id="4" name="Footer Placeholder 3">
+            <a:extLst>
+              <a:ext uri="{FF2B5EF4-FFF2-40B4-BE49-F238E27FC236}">
+                <a16:creationId xmlns:a16="http://schemas.microsoft.com/office/drawing/2014/main" id="{31609282-3569-5D2E-C51F-1A2583D37110}"/>
+              </a:ext>
+            </a:extLst>
+          </p:cNvPr>
+          <p:cNvSpPr>
+            <a:spLocks noGrp="1"/>
+          </p:cNvSpPr>
+          <p:nvPr>
+            <p:ph type="ftr" sz="quarter" idx="11"/>
+          </p:nvPr>
+        </p:nvSpPr>
+        <p:spPr/>
+        <p:txBody>
+          <a:bodyPr/>
+          <a:lstStyle/>
+          <a:p>
+            <a:endParaRPr lang="en-US"/>
+          </a:p>
+        </p:txBody>
+      </p:sp>
+      <p:sp>
+        <p:nvSpPr>
+          <p:cNvPr id="5" name="Slide Number Placeholder 4">
+            <a:extLst>
+              <a:ext uri="{FF2B5EF4-FFF2-40B4-BE49-F238E27FC236}">
+                <a16:creationId xmlns:a16="http://schemas.microsoft.com/office/drawing/2014/main" id="{2329C2E4-1D5F-0D0E-B3C9-1A88FD31AEB4}"/>
+              </a:ext>
+            </a:extLst>
+          </p:cNvPr>
+          <p:cNvSpPr>
+            <a:spLocks noGrp="1"/>
+          </p:cNvSpPr>
+          <p:nvPr>
+            <p:ph type="sldNum" sz="quarter" idx="12"/>
+          </p:nvPr>
+        </p:nvSpPr>
+        <p:spPr/>
+        <p:txBody>
+          <a:bodyPr/>
+          <a:lstStyle/>
+          <a:p>
+            <a:fld id="{62CBAC88-EF5B-3148-888C-824478CD1B05}" type="slidenum">
+              <a:rPr lang="en-US" smtClean="0"/>
+              <a:t>24</a:t>
+            </a:fld>
+            <a:endParaRPr lang="en-US"/>
           </a:p>
         </p:txBody>
       </p:sp>
@@ -5267,6 +6311,60 @@
           </a:p>
         </p:txBody>
       </p:sp>
+      <p:sp>
+        <p:nvSpPr>
+          <p:cNvPr id="4" name="Footer Placeholder 3">
+            <a:extLst>
+              <a:ext uri="{FF2B5EF4-FFF2-40B4-BE49-F238E27FC236}">
+                <a16:creationId xmlns:a16="http://schemas.microsoft.com/office/drawing/2014/main" id="{51CC993D-FCD0-FA62-1E72-3E330C69ECE2}"/>
+              </a:ext>
+            </a:extLst>
+          </p:cNvPr>
+          <p:cNvSpPr>
+            <a:spLocks noGrp="1"/>
+          </p:cNvSpPr>
+          <p:nvPr>
+            <p:ph type="ftr" sz="quarter" idx="11"/>
+          </p:nvPr>
+        </p:nvSpPr>
+        <p:spPr/>
+        <p:txBody>
+          <a:bodyPr/>
+          <a:lstStyle/>
+          <a:p>
+            <a:endParaRPr lang="en-US"/>
+          </a:p>
+        </p:txBody>
+      </p:sp>
+      <p:sp>
+        <p:nvSpPr>
+          <p:cNvPr id="5" name="Slide Number Placeholder 4">
+            <a:extLst>
+              <a:ext uri="{FF2B5EF4-FFF2-40B4-BE49-F238E27FC236}">
+                <a16:creationId xmlns:a16="http://schemas.microsoft.com/office/drawing/2014/main" id="{C98DB94D-DD1A-5A91-6C6E-8DD5FE2A3008}"/>
+              </a:ext>
+            </a:extLst>
+          </p:cNvPr>
+          <p:cNvSpPr>
+            <a:spLocks noGrp="1"/>
+          </p:cNvSpPr>
+          <p:nvPr>
+            <p:ph type="sldNum" sz="quarter" idx="12"/>
+          </p:nvPr>
+        </p:nvSpPr>
+        <p:spPr/>
+        <p:txBody>
+          <a:bodyPr/>
+          <a:lstStyle/>
+          <a:p>
+            <a:fld id="{62CBAC88-EF5B-3148-888C-824478CD1B05}" type="slidenum">
+              <a:rPr lang="en-US" smtClean="0"/>
+              <a:t>25</a:t>
+            </a:fld>
+            <a:endParaRPr lang="en-US"/>
+          </a:p>
+        </p:txBody>
+      </p:sp>
     </p:spTree>
     <p:extLst>
       <p:ext uri="{BB962C8B-B14F-4D97-AF65-F5344CB8AC3E}">
@@ -5419,6 +6517,60 @@
           </a:p>
         </p:txBody>
       </p:sp>
+      <p:sp>
+        <p:nvSpPr>
+          <p:cNvPr id="4" name="Footer Placeholder 3">
+            <a:extLst>
+              <a:ext uri="{FF2B5EF4-FFF2-40B4-BE49-F238E27FC236}">
+                <a16:creationId xmlns:a16="http://schemas.microsoft.com/office/drawing/2014/main" id="{1E40343D-B93F-59EE-6C65-B699585BA96E}"/>
+              </a:ext>
+            </a:extLst>
+          </p:cNvPr>
+          <p:cNvSpPr>
+            <a:spLocks noGrp="1"/>
+          </p:cNvSpPr>
+          <p:nvPr>
+            <p:ph type="ftr" sz="quarter" idx="11"/>
+          </p:nvPr>
+        </p:nvSpPr>
+        <p:spPr/>
+        <p:txBody>
+          <a:bodyPr/>
+          <a:lstStyle/>
+          <a:p>
+            <a:endParaRPr lang="en-US"/>
+          </a:p>
+        </p:txBody>
+      </p:sp>
+      <p:sp>
+        <p:nvSpPr>
+          <p:cNvPr id="5" name="Slide Number Placeholder 4">
+            <a:extLst>
+              <a:ext uri="{FF2B5EF4-FFF2-40B4-BE49-F238E27FC236}">
+                <a16:creationId xmlns:a16="http://schemas.microsoft.com/office/drawing/2014/main" id="{D378C706-BB0D-4EF9-F3A0-A77EAA5AB31C}"/>
+              </a:ext>
+            </a:extLst>
+          </p:cNvPr>
+          <p:cNvSpPr>
+            <a:spLocks noGrp="1"/>
+          </p:cNvSpPr>
+          <p:nvPr>
+            <p:ph type="sldNum" sz="quarter" idx="12"/>
+          </p:nvPr>
+        </p:nvSpPr>
+        <p:spPr/>
+        <p:txBody>
+          <a:bodyPr/>
+          <a:lstStyle/>
+          <a:p>
+            <a:fld id="{62CBAC88-EF5B-3148-888C-824478CD1B05}" type="slidenum">
+              <a:rPr lang="en-US" smtClean="0"/>
+              <a:t>26</a:t>
+            </a:fld>
+            <a:endParaRPr lang="en-US"/>
+          </a:p>
+        </p:txBody>
+      </p:sp>
     </p:spTree>
     <p:extLst>
       <p:ext uri="{BB962C8B-B14F-4D97-AF65-F5344CB8AC3E}">
@@ -5463,6 +6615,36 @@
       </p:grpSpPr>
       <p:sp>
         <p:nvSpPr>
+          <p:cNvPr id="2" name="Title 1">
+            <a:extLst>
+              <a:ext uri="{FF2B5EF4-FFF2-40B4-BE49-F238E27FC236}">
+                <a16:creationId xmlns:a16="http://schemas.microsoft.com/office/drawing/2014/main" id="{CBD24C9B-57FA-90C9-F9DD-E68FDBAFDAC2}"/>
+              </a:ext>
+            </a:extLst>
+          </p:cNvPr>
+          <p:cNvSpPr>
+            <a:spLocks noGrp="1"/>
+          </p:cNvSpPr>
+          <p:nvPr>
+            <p:ph type="title"/>
+          </p:nvPr>
+        </p:nvSpPr>
+        <p:spPr/>
+        <p:txBody>
+          <a:bodyPr>
+            <a:normAutofit/>
+          </a:bodyPr>
+          <a:lstStyle/>
+          <a:p>
+            <a:r>
+              <a:rPr lang="en-US" dirty="0"/>
+              <a:t>Edit and Update</a:t>
+            </a:r>
+          </a:p>
+        </p:txBody>
+      </p:sp>
+      <p:sp>
+        <p:nvSpPr>
           <p:cNvPr id="3" name="Content Placeholder 2">
             <a:extLst>
               <a:ext uri="{FF2B5EF4-FFF2-40B4-BE49-F238E27FC236}">
@@ -5659,31 +6841,55 @@
       </p:sp>
       <p:sp>
         <p:nvSpPr>
-          <p:cNvPr id="2" name="Title 1">
-            <a:extLst>
-              <a:ext uri="{FF2B5EF4-FFF2-40B4-BE49-F238E27FC236}">
-                <a16:creationId xmlns:a16="http://schemas.microsoft.com/office/drawing/2014/main" id="{CBD24C9B-57FA-90C9-F9DD-E68FDBAFDAC2}"/>
-              </a:ext>
-            </a:extLst>
-          </p:cNvPr>
-          <p:cNvSpPr>
-            <a:spLocks noGrp="1"/>
-          </p:cNvSpPr>
-          <p:nvPr>
-            <p:ph type="title"/>
-          </p:nvPr>
-        </p:nvSpPr>
-        <p:spPr/>
-        <p:txBody>
-          <a:bodyPr>
-            <a:normAutofit/>
-          </a:bodyPr>
-          <a:lstStyle/>
-          <a:p>
-            <a:r>
-              <a:rPr lang="en-US" dirty="0"/>
-              <a:t>Edit and Update</a:t>
-            </a:r>
+          <p:cNvPr id="4" name="Footer Placeholder 3">
+            <a:extLst>
+              <a:ext uri="{FF2B5EF4-FFF2-40B4-BE49-F238E27FC236}">
+                <a16:creationId xmlns:a16="http://schemas.microsoft.com/office/drawing/2014/main" id="{FAE41998-4652-530B-5B2D-C0655CC5875F}"/>
+              </a:ext>
+            </a:extLst>
+          </p:cNvPr>
+          <p:cNvSpPr>
+            <a:spLocks noGrp="1"/>
+          </p:cNvSpPr>
+          <p:nvPr>
+            <p:ph type="ftr" sz="quarter" idx="11"/>
+          </p:nvPr>
+        </p:nvSpPr>
+        <p:spPr/>
+        <p:txBody>
+          <a:bodyPr/>
+          <a:lstStyle/>
+          <a:p>
+            <a:endParaRPr lang="en-US"/>
+          </a:p>
+        </p:txBody>
+      </p:sp>
+      <p:sp>
+        <p:nvSpPr>
+          <p:cNvPr id="5" name="Slide Number Placeholder 4">
+            <a:extLst>
+              <a:ext uri="{FF2B5EF4-FFF2-40B4-BE49-F238E27FC236}">
+                <a16:creationId xmlns:a16="http://schemas.microsoft.com/office/drawing/2014/main" id="{84306F90-B4B8-B279-43AD-BA0091FD36FA}"/>
+              </a:ext>
+            </a:extLst>
+          </p:cNvPr>
+          <p:cNvSpPr>
+            <a:spLocks noGrp="1"/>
+          </p:cNvSpPr>
+          <p:nvPr>
+            <p:ph type="sldNum" sz="quarter" idx="12"/>
+          </p:nvPr>
+        </p:nvSpPr>
+        <p:spPr/>
+        <p:txBody>
+          <a:bodyPr/>
+          <a:lstStyle/>
+          <a:p>
+            <a:fld id="{62CBAC88-EF5B-3148-888C-824478CD1B05}" type="slidenum">
+              <a:rPr lang="en-US" smtClean="0"/>
+              <a:t>27</a:t>
+            </a:fld>
+            <a:endParaRPr lang="en-US"/>
           </a:p>
         </p:txBody>
       </p:sp>
@@ -5887,6 +7093,60 @@
           </a:p>
         </p:txBody>
       </p:sp>
+      <p:sp>
+        <p:nvSpPr>
+          <p:cNvPr id="4" name="Footer Placeholder 3">
+            <a:extLst>
+              <a:ext uri="{FF2B5EF4-FFF2-40B4-BE49-F238E27FC236}">
+                <a16:creationId xmlns:a16="http://schemas.microsoft.com/office/drawing/2014/main" id="{5386C3C8-83C3-36F5-695C-B982671627D4}"/>
+              </a:ext>
+            </a:extLst>
+          </p:cNvPr>
+          <p:cNvSpPr>
+            <a:spLocks noGrp="1"/>
+          </p:cNvSpPr>
+          <p:nvPr>
+            <p:ph type="ftr" sz="quarter" idx="11"/>
+          </p:nvPr>
+        </p:nvSpPr>
+        <p:spPr/>
+        <p:txBody>
+          <a:bodyPr/>
+          <a:lstStyle/>
+          <a:p>
+            <a:endParaRPr lang="en-US"/>
+          </a:p>
+        </p:txBody>
+      </p:sp>
+      <p:sp>
+        <p:nvSpPr>
+          <p:cNvPr id="5" name="Slide Number Placeholder 4">
+            <a:extLst>
+              <a:ext uri="{FF2B5EF4-FFF2-40B4-BE49-F238E27FC236}">
+                <a16:creationId xmlns:a16="http://schemas.microsoft.com/office/drawing/2014/main" id="{B592F44B-91EC-32B0-3A41-501863759A20}"/>
+              </a:ext>
+            </a:extLst>
+          </p:cNvPr>
+          <p:cNvSpPr>
+            <a:spLocks noGrp="1"/>
+          </p:cNvSpPr>
+          <p:nvPr>
+            <p:ph type="sldNum" sz="quarter" idx="12"/>
+          </p:nvPr>
+        </p:nvSpPr>
+        <p:spPr/>
+        <p:txBody>
+          <a:bodyPr/>
+          <a:lstStyle/>
+          <a:p>
+            <a:fld id="{62CBAC88-EF5B-3148-888C-824478CD1B05}" type="slidenum">
+              <a:rPr lang="en-US" smtClean="0"/>
+              <a:t>28</a:t>
+            </a:fld>
+            <a:endParaRPr lang="en-US"/>
+          </a:p>
+        </p:txBody>
+      </p:sp>
     </p:spTree>
     <p:extLst>
       <p:ext uri="{BB962C8B-B14F-4D97-AF65-F5344CB8AC3E}">
@@ -6030,6 +7290,60 @@
           </a:p>
         </p:txBody>
       </p:sp>
+      <p:sp>
+        <p:nvSpPr>
+          <p:cNvPr id="2" name="Footer Placeholder 1">
+            <a:extLst>
+              <a:ext uri="{FF2B5EF4-FFF2-40B4-BE49-F238E27FC236}">
+                <a16:creationId xmlns:a16="http://schemas.microsoft.com/office/drawing/2014/main" id="{7C374433-891E-FEE5-55B8-8C92B13D2EBC}"/>
+              </a:ext>
+            </a:extLst>
+          </p:cNvPr>
+          <p:cNvSpPr>
+            <a:spLocks noGrp="1"/>
+          </p:cNvSpPr>
+          <p:nvPr>
+            <p:ph type="ftr" sz="quarter" idx="11"/>
+          </p:nvPr>
+        </p:nvSpPr>
+        <p:spPr/>
+        <p:txBody>
+          <a:bodyPr/>
+          <a:lstStyle/>
+          <a:p>
+            <a:endParaRPr lang="en-US"/>
+          </a:p>
+        </p:txBody>
+      </p:sp>
+      <p:sp>
+        <p:nvSpPr>
+          <p:cNvPr id="3" name="Slide Number Placeholder 2">
+            <a:extLst>
+              <a:ext uri="{FF2B5EF4-FFF2-40B4-BE49-F238E27FC236}">
+                <a16:creationId xmlns:a16="http://schemas.microsoft.com/office/drawing/2014/main" id="{D8DC87AB-5DB9-0368-2E6A-1C4D9CAD2881}"/>
+              </a:ext>
+            </a:extLst>
+          </p:cNvPr>
+          <p:cNvSpPr>
+            <a:spLocks noGrp="1"/>
+          </p:cNvSpPr>
+          <p:nvPr>
+            <p:ph type="sldNum" sz="quarter" idx="12"/>
+          </p:nvPr>
+        </p:nvSpPr>
+        <p:spPr/>
+        <p:txBody>
+          <a:bodyPr/>
+          <a:lstStyle/>
+          <a:p>
+            <a:fld id="{62CBAC88-EF5B-3148-888C-824478CD1B05}" type="slidenum">
+              <a:rPr lang="en-US" smtClean="0"/>
+              <a:t>29</a:t>
+            </a:fld>
+            <a:endParaRPr lang="en-US"/>
+          </a:p>
+        </p:txBody>
+      </p:sp>
     </p:spTree>
     <p:extLst>
       <p:ext uri="{BB962C8B-B14F-4D97-AF65-F5344CB8AC3E}">
@@ -6074,6 +7388,34 @@
       </p:grpSpPr>
       <p:sp>
         <p:nvSpPr>
+          <p:cNvPr id="2" name="Title 1">
+            <a:extLst>
+              <a:ext uri="{FF2B5EF4-FFF2-40B4-BE49-F238E27FC236}">
+                <a16:creationId xmlns:a16="http://schemas.microsoft.com/office/drawing/2014/main" id="{6CFD6A54-236B-6830-1358-48501E4EC030}"/>
+              </a:ext>
+            </a:extLst>
+          </p:cNvPr>
+          <p:cNvSpPr>
+            <a:spLocks noGrp="1"/>
+          </p:cNvSpPr>
+          <p:nvPr>
+            <p:ph type="title"/>
+          </p:nvPr>
+        </p:nvSpPr>
+        <p:spPr/>
+        <p:txBody>
+          <a:bodyPr/>
+          <a:lstStyle/>
+          <a:p>
+            <a:r>
+              <a:rPr lang="en-US" dirty="0"/>
+              <a:t>Introduction</a:t>
+            </a:r>
+          </a:p>
+        </p:txBody>
+      </p:sp>
+      <p:sp>
+        <p:nvSpPr>
           <p:cNvPr id="3" name="Content Placeholder 2">
             <a:extLst>
               <a:ext uri="{FF2B5EF4-FFF2-40B4-BE49-F238E27FC236}">
@@ -6149,29 +7491,55 @@
       </p:sp>
       <p:sp>
         <p:nvSpPr>
-          <p:cNvPr id="2" name="Title 1">
-            <a:extLst>
-              <a:ext uri="{FF2B5EF4-FFF2-40B4-BE49-F238E27FC236}">
-                <a16:creationId xmlns:a16="http://schemas.microsoft.com/office/drawing/2014/main" id="{6CFD6A54-236B-6830-1358-48501E4EC030}"/>
-              </a:ext>
-            </a:extLst>
-          </p:cNvPr>
-          <p:cNvSpPr>
-            <a:spLocks noGrp="1"/>
-          </p:cNvSpPr>
-          <p:nvPr>
-            <p:ph type="title"/>
-          </p:nvPr>
-        </p:nvSpPr>
-        <p:spPr/>
-        <p:txBody>
-          <a:bodyPr/>
-          <a:lstStyle/>
-          <a:p>
-            <a:r>
-              <a:rPr lang="en-US" dirty="0"/>
-              <a:t>Introduction</a:t>
-            </a:r>
+          <p:cNvPr id="4" name="Footer Placeholder 3">
+            <a:extLst>
+              <a:ext uri="{FF2B5EF4-FFF2-40B4-BE49-F238E27FC236}">
+                <a16:creationId xmlns:a16="http://schemas.microsoft.com/office/drawing/2014/main" id="{F09FEB8E-8E4B-80C0-01F2-D81BD7E3A60D}"/>
+              </a:ext>
+            </a:extLst>
+          </p:cNvPr>
+          <p:cNvSpPr>
+            <a:spLocks noGrp="1"/>
+          </p:cNvSpPr>
+          <p:nvPr>
+            <p:ph type="ftr" sz="quarter" idx="11"/>
+          </p:nvPr>
+        </p:nvSpPr>
+        <p:spPr/>
+        <p:txBody>
+          <a:bodyPr/>
+          <a:lstStyle/>
+          <a:p>
+            <a:endParaRPr lang="en-US"/>
+          </a:p>
+        </p:txBody>
+      </p:sp>
+      <p:sp>
+        <p:nvSpPr>
+          <p:cNvPr id="5" name="Slide Number Placeholder 4">
+            <a:extLst>
+              <a:ext uri="{FF2B5EF4-FFF2-40B4-BE49-F238E27FC236}">
+                <a16:creationId xmlns:a16="http://schemas.microsoft.com/office/drawing/2014/main" id="{58F8964E-9EE3-B7BE-FE79-C69783737ED8}"/>
+              </a:ext>
+            </a:extLst>
+          </p:cNvPr>
+          <p:cNvSpPr>
+            <a:spLocks noGrp="1"/>
+          </p:cNvSpPr>
+          <p:nvPr>
+            <p:ph type="sldNum" sz="quarter" idx="12"/>
+          </p:nvPr>
+        </p:nvSpPr>
+        <p:spPr/>
+        <p:txBody>
+          <a:bodyPr/>
+          <a:lstStyle/>
+          <a:p>
+            <a:fld id="{62CBAC88-EF5B-3148-888C-824478CD1B05}" type="slidenum">
+              <a:rPr lang="en-US" smtClean="0"/>
+              <a:t>3</a:t>
+            </a:fld>
+            <a:endParaRPr lang="en-US"/>
           </a:p>
         </p:txBody>
       </p:sp>
@@ -6263,12 +7631,7 @@
             <p:ph idx="1"/>
           </p:nvPr>
         </p:nvSpPr>
-        <p:spPr>
-          <a:xfrm>
-            <a:off x="609600" y="1600201"/>
-            <a:ext cx="10972800" cy="4525963"/>
-          </a:xfrm>
-        </p:spPr>
+        <p:spPr/>
         <p:txBody>
           <a:bodyPr>
             <a:normAutofit/>
@@ -6310,6 +7673,60 @@
               <a:rPr lang="en-US" dirty="0"/>
               <a:t>Provides flexibility for custom responses</a:t>
             </a:r>
+          </a:p>
+        </p:txBody>
+      </p:sp>
+      <p:sp>
+        <p:nvSpPr>
+          <p:cNvPr id="4" name="Footer Placeholder 3">
+            <a:extLst>
+              <a:ext uri="{FF2B5EF4-FFF2-40B4-BE49-F238E27FC236}">
+                <a16:creationId xmlns:a16="http://schemas.microsoft.com/office/drawing/2014/main" id="{A6FB144E-7112-E548-8C8A-7DF5CE3073B5}"/>
+              </a:ext>
+            </a:extLst>
+          </p:cNvPr>
+          <p:cNvSpPr>
+            <a:spLocks noGrp="1"/>
+          </p:cNvSpPr>
+          <p:nvPr>
+            <p:ph type="ftr" sz="quarter" idx="11"/>
+          </p:nvPr>
+        </p:nvSpPr>
+        <p:spPr/>
+        <p:txBody>
+          <a:bodyPr/>
+          <a:lstStyle/>
+          <a:p>
+            <a:endParaRPr lang="en-US"/>
+          </a:p>
+        </p:txBody>
+      </p:sp>
+      <p:sp>
+        <p:nvSpPr>
+          <p:cNvPr id="5" name="Slide Number Placeholder 4">
+            <a:extLst>
+              <a:ext uri="{FF2B5EF4-FFF2-40B4-BE49-F238E27FC236}">
+                <a16:creationId xmlns:a16="http://schemas.microsoft.com/office/drawing/2014/main" id="{E9F0D6BD-FCD8-A090-AE01-174C785723E1}"/>
+              </a:ext>
+            </a:extLst>
+          </p:cNvPr>
+          <p:cNvSpPr>
+            <a:spLocks noGrp="1"/>
+          </p:cNvSpPr>
+          <p:nvPr>
+            <p:ph type="sldNum" sz="quarter" idx="12"/>
+          </p:nvPr>
+        </p:nvSpPr>
+        <p:spPr/>
+        <p:txBody>
+          <a:bodyPr/>
+          <a:lstStyle/>
+          <a:p>
+            <a:fld id="{62CBAC88-EF5B-3148-888C-824478CD1B05}" type="slidenum">
+              <a:rPr lang="en-US" smtClean="0"/>
+              <a:t>30</a:t>
+            </a:fld>
+            <a:endParaRPr lang="en-US"/>
           </a:p>
         </p:txBody>
       </p:sp>
@@ -6509,6 +7926,60 @@
           </a:p>
         </p:txBody>
       </p:sp>
+      <p:sp>
+        <p:nvSpPr>
+          <p:cNvPr id="4" name="Footer Placeholder 3">
+            <a:extLst>
+              <a:ext uri="{FF2B5EF4-FFF2-40B4-BE49-F238E27FC236}">
+                <a16:creationId xmlns:a16="http://schemas.microsoft.com/office/drawing/2014/main" id="{642C58F4-9DE9-AFD8-67A4-9CE1641D4D05}"/>
+              </a:ext>
+            </a:extLst>
+          </p:cNvPr>
+          <p:cNvSpPr>
+            <a:spLocks noGrp="1"/>
+          </p:cNvSpPr>
+          <p:nvPr>
+            <p:ph type="ftr" sz="quarter" idx="11"/>
+          </p:nvPr>
+        </p:nvSpPr>
+        <p:spPr/>
+        <p:txBody>
+          <a:bodyPr/>
+          <a:lstStyle/>
+          <a:p>
+            <a:endParaRPr lang="en-US"/>
+          </a:p>
+        </p:txBody>
+      </p:sp>
+      <p:sp>
+        <p:nvSpPr>
+          <p:cNvPr id="5" name="Slide Number Placeholder 4">
+            <a:extLst>
+              <a:ext uri="{FF2B5EF4-FFF2-40B4-BE49-F238E27FC236}">
+                <a16:creationId xmlns:a16="http://schemas.microsoft.com/office/drawing/2014/main" id="{DCB2CEF8-97B9-D948-77D1-61077AF8B02D}"/>
+              </a:ext>
+            </a:extLst>
+          </p:cNvPr>
+          <p:cNvSpPr>
+            <a:spLocks noGrp="1"/>
+          </p:cNvSpPr>
+          <p:nvPr>
+            <p:ph type="sldNum" sz="quarter" idx="12"/>
+          </p:nvPr>
+        </p:nvSpPr>
+        <p:spPr/>
+        <p:txBody>
+          <a:bodyPr/>
+          <a:lstStyle/>
+          <a:p>
+            <a:fld id="{62CBAC88-EF5B-3148-888C-824478CD1B05}" type="slidenum">
+              <a:rPr lang="en-US" smtClean="0"/>
+              <a:t>31</a:t>
+            </a:fld>
+            <a:endParaRPr lang="en-US"/>
+          </a:p>
+        </p:txBody>
+      </p:sp>
     </p:spTree>
     <p:extLst>
       <p:ext uri="{BB962C8B-B14F-4D97-AF65-F5344CB8AC3E}">
@@ -6693,6 +8164,60 @@
           </a:p>
         </p:txBody>
       </p:sp>
+      <p:sp>
+        <p:nvSpPr>
+          <p:cNvPr id="4" name="Footer Placeholder 3">
+            <a:extLst>
+              <a:ext uri="{FF2B5EF4-FFF2-40B4-BE49-F238E27FC236}">
+                <a16:creationId xmlns:a16="http://schemas.microsoft.com/office/drawing/2014/main" id="{AF6F4A12-7391-AAF0-7905-0C3D60FD4041}"/>
+              </a:ext>
+            </a:extLst>
+          </p:cNvPr>
+          <p:cNvSpPr>
+            <a:spLocks noGrp="1"/>
+          </p:cNvSpPr>
+          <p:nvPr>
+            <p:ph type="ftr" sz="quarter" idx="11"/>
+          </p:nvPr>
+        </p:nvSpPr>
+        <p:spPr/>
+        <p:txBody>
+          <a:bodyPr/>
+          <a:lstStyle/>
+          <a:p>
+            <a:endParaRPr lang="en-US"/>
+          </a:p>
+        </p:txBody>
+      </p:sp>
+      <p:sp>
+        <p:nvSpPr>
+          <p:cNvPr id="5" name="Slide Number Placeholder 4">
+            <a:extLst>
+              <a:ext uri="{FF2B5EF4-FFF2-40B4-BE49-F238E27FC236}">
+                <a16:creationId xmlns:a16="http://schemas.microsoft.com/office/drawing/2014/main" id="{6FA58149-04E5-4A2E-8BE2-62DEFD54B2FE}"/>
+              </a:ext>
+            </a:extLst>
+          </p:cNvPr>
+          <p:cNvSpPr>
+            <a:spLocks noGrp="1"/>
+          </p:cNvSpPr>
+          <p:nvPr>
+            <p:ph type="sldNum" sz="quarter" idx="12"/>
+          </p:nvPr>
+        </p:nvSpPr>
+        <p:spPr/>
+        <p:txBody>
+          <a:bodyPr/>
+          <a:lstStyle/>
+          <a:p>
+            <a:fld id="{62CBAC88-EF5B-3148-888C-824478CD1B05}" type="slidenum">
+              <a:rPr lang="en-US" smtClean="0"/>
+              <a:t>32</a:t>
+            </a:fld>
+            <a:endParaRPr lang="en-US"/>
+          </a:p>
+        </p:txBody>
+      </p:sp>
     </p:spTree>
     <p:extLst>
       <p:ext uri="{BB962C8B-B14F-4D97-AF65-F5344CB8AC3E}">
@@ -6870,6 +8395,60 @@
           </a:p>
         </p:txBody>
       </p:sp>
+      <p:sp>
+        <p:nvSpPr>
+          <p:cNvPr id="4" name="Footer Placeholder 3">
+            <a:extLst>
+              <a:ext uri="{FF2B5EF4-FFF2-40B4-BE49-F238E27FC236}">
+                <a16:creationId xmlns:a16="http://schemas.microsoft.com/office/drawing/2014/main" id="{87AE1D42-FC66-DB4D-4246-2A5729AD5C62}"/>
+              </a:ext>
+            </a:extLst>
+          </p:cNvPr>
+          <p:cNvSpPr>
+            <a:spLocks noGrp="1"/>
+          </p:cNvSpPr>
+          <p:nvPr>
+            <p:ph type="ftr" sz="quarter" idx="11"/>
+          </p:nvPr>
+        </p:nvSpPr>
+        <p:spPr/>
+        <p:txBody>
+          <a:bodyPr/>
+          <a:lstStyle/>
+          <a:p>
+            <a:endParaRPr lang="en-US"/>
+          </a:p>
+        </p:txBody>
+      </p:sp>
+      <p:sp>
+        <p:nvSpPr>
+          <p:cNvPr id="5" name="Slide Number Placeholder 4">
+            <a:extLst>
+              <a:ext uri="{FF2B5EF4-FFF2-40B4-BE49-F238E27FC236}">
+                <a16:creationId xmlns:a16="http://schemas.microsoft.com/office/drawing/2014/main" id="{C7221E05-9C4D-72FD-4F0E-C89C49CD0F9B}"/>
+              </a:ext>
+            </a:extLst>
+          </p:cNvPr>
+          <p:cNvSpPr>
+            <a:spLocks noGrp="1"/>
+          </p:cNvSpPr>
+          <p:nvPr>
+            <p:ph type="sldNum" sz="quarter" idx="12"/>
+          </p:nvPr>
+        </p:nvSpPr>
+        <p:spPr/>
+        <p:txBody>
+          <a:bodyPr/>
+          <a:lstStyle/>
+          <a:p>
+            <a:fld id="{62CBAC88-EF5B-3148-888C-824478CD1B05}" type="slidenum">
+              <a:rPr lang="en-US" smtClean="0"/>
+              <a:t>33</a:t>
+            </a:fld>
+            <a:endParaRPr lang="en-US"/>
+          </a:p>
+        </p:txBody>
+      </p:sp>
     </p:spTree>
     <p:extLst>
       <p:ext uri="{BB962C8B-B14F-4D97-AF65-F5344CB8AC3E}">
@@ -7081,6 +8660,60 @@
           </a:p>
         </p:txBody>
       </p:sp>
+      <p:sp>
+        <p:nvSpPr>
+          <p:cNvPr id="4" name="Footer Placeholder 3">
+            <a:extLst>
+              <a:ext uri="{FF2B5EF4-FFF2-40B4-BE49-F238E27FC236}">
+                <a16:creationId xmlns:a16="http://schemas.microsoft.com/office/drawing/2014/main" id="{D4421C7D-59D8-65FC-A051-7D58FD8417EB}"/>
+              </a:ext>
+            </a:extLst>
+          </p:cNvPr>
+          <p:cNvSpPr>
+            <a:spLocks noGrp="1"/>
+          </p:cNvSpPr>
+          <p:nvPr>
+            <p:ph type="ftr" sz="quarter" idx="11"/>
+          </p:nvPr>
+        </p:nvSpPr>
+        <p:spPr/>
+        <p:txBody>
+          <a:bodyPr/>
+          <a:lstStyle/>
+          <a:p>
+            <a:endParaRPr lang="en-US"/>
+          </a:p>
+        </p:txBody>
+      </p:sp>
+      <p:sp>
+        <p:nvSpPr>
+          <p:cNvPr id="5" name="Slide Number Placeholder 4">
+            <a:extLst>
+              <a:ext uri="{FF2B5EF4-FFF2-40B4-BE49-F238E27FC236}">
+                <a16:creationId xmlns:a16="http://schemas.microsoft.com/office/drawing/2014/main" id="{A4548191-F46E-D343-405A-4E9532C71C7A}"/>
+              </a:ext>
+            </a:extLst>
+          </p:cNvPr>
+          <p:cNvSpPr>
+            <a:spLocks noGrp="1"/>
+          </p:cNvSpPr>
+          <p:nvPr>
+            <p:ph type="sldNum" sz="quarter" idx="12"/>
+          </p:nvPr>
+        </p:nvSpPr>
+        <p:spPr/>
+        <p:txBody>
+          <a:bodyPr/>
+          <a:lstStyle/>
+          <a:p>
+            <a:fld id="{62CBAC88-EF5B-3148-888C-824478CD1B05}" type="slidenum">
+              <a:rPr lang="en-US" smtClean="0"/>
+              <a:t>34</a:t>
+            </a:fld>
+            <a:endParaRPr lang="en-US"/>
+          </a:p>
+        </p:txBody>
+      </p:sp>
     </p:spTree>
     <p:extLst>
       <p:ext uri="{BB962C8B-B14F-4D97-AF65-F5344CB8AC3E}">
@@ -7374,6 +9007,60 @@
           </a:p>
         </p:txBody>
       </p:sp>
+      <p:sp>
+        <p:nvSpPr>
+          <p:cNvPr id="4" name="Footer Placeholder 3">
+            <a:extLst>
+              <a:ext uri="{FF2B5EF4-FFF2-40B4-BE49-F238E27FC236}">
+                <a16:creationId xmlns:a16="http://schemas.microsoft.com/office/drawing/2014/main" id="{EB129E55-9C0D-9F40-3D06-F8465BEDB6C8}"/>
+              </a:ext>
+            </a:extLst>
+          </p:cNvPr>
+          <p:cNvSpPr>
+            <a:spLocks noGrp="1"/>
+          </p:cNvSpPr>
+          <p:nvPr>
+            <p:ph type="ftr" sz="quarter" idx="11"/>
+          </p:nvPr>
+        </p:nvSpPr>
+        <p:spPr/>
+        <p:txBody>
+          <a:bodyPr/>
+          <a:lstStyle/>
+          <a:p>
+            <a:endParaRPr lang="en-US"/>
+          </a:p>
+        </p:txBody>
+      </p:sp>
+      <p:sp>
+        <p:nvSpPr>
+          <p:cNvPr id="5" name="Slide Number Placeholder 4">
+            <a:extLst>
+              <a:ext uri="{FF2B5EF4-FFF2-40B4-BE49-F238E27FC236}">
+                <a16:creationId xmlns:a16="http://schemas.microsoft.com/office/drawing/2014/main" id="{ED61A9B8-8319-0C19-8A08-FAA7BE0D6B76}"/>
+              </a:ext>
+            </a:extLst>
+          </p:cNvPr>
+          <p:cNvSpPr>
+            <a:spLocks noGrp="1"/>
+          </p:cNvSpPr>
+          <p:nvPr>
+            <p:ph type="sldNum" sz="quarter" idx="12"/>
+          </p:nvPr>
+        </p:nvSpPr>
+        <p:spPr/>
+        <p:txBody>
+          <a:bodyPr/>
+          <a:lstStyle/>
+          <a:p>
+            <a:fld id="{62CBAC88-EF5B-3148-888C-824478CD1B05}" type="slidenum">
+              <a:rPr lang="en-US" smtClean="0"/>
+              <a:t>35</a:t>
+            </a:fld>
+            <a:endParaRPr lang="en-US"/>
+          </a:p>
+        </p:txBody>
+      </p:sp>
     </p:spTree>
     <p:extLst>
       <p:ext uri="{BB962C8B-B14F-4D97-AF65-F5344CB8AC3E}">
@@ -7644,6 +9331,60 @@
           </a:p>
         </p:txBody>
       </p:sp>
+      <p:sp>
+        <p:nvSpPr>
+          <p:cNvPr id="4" name="Footer Placeholder 3">
+            <a:extLst>
+              <a:ext uri="{FF2B5EF4-FFF2-40B4-BE49-F238E27FC236}">
+                <a16:creationId xmlns:a16="http://schemas.microsoft.com/office/drawing/2014/main" id="{7F3679A4-2BD5-6979-0509-2C19DD25FB75}"/>
+              </a:ext>
+            </a:extLst>
+          </p:cNvPr>
+          <p:cNvSpPr>
+            <a:spLocks noGrp="1"/>
+          </p:cNvSpPr>
+          <p:nvPr>
+            <p:ph type="ftr" sz="quarter" idx="11"/>
+          </p:nvPr>
+        </p:nvSpPr>
+        <p:spPr/>
+        <p:txBody>
+          <a:bodyPr/>
+          <a:lstStyle/>
+          <a:p>
+            <a:endParaRPr lang="en-US"/>
+          </a:p>
+        </p:txBody>
+      </p:sp>
+      <p:sp>
+        <p:nvSpPr>
+          <p:cNvPr id="5" name="Slide Number Placeholder 4">
+            <a:extLst>
+              <a:ext uri="{FF2B5EF4-FFF2-40B4-BE49-F238E27FC236}">
+                <a16:creationId xmlns:a16="http://schemas.microsoft.com/office/drawing/2014/main" id="{3201B80F-CC00-91E1-B9D4-5ABECD331256}"/>
+              </a:ext>
+            </a:extLst>
+          </p:cNvPr>
+          <p:cNvSpPr>
+            <a:spLocks noGrp="1"/>
+          </p:cNvSpPr>
+          <p:nvPr>
+            <p:ph type="sldNum" sz="quarter" idx="12"/>
+          </p:nvPr>
+        </p:nvSpPr>
+        <p:spPr/>
+        <p:txBody>
+          <a:bodyPr/>
+          <a:lstStyle/>
+          <a:p>
+            <a:fld id="{62CBAC88-EF5B-3148-888C-824478CD1B05}" type="slidenum">
+              <a:rPr lang="en-US" smtClean="0"/>
+              <a:t>36</a:t>
+            </a:fld>
+            <a:endParaRPr lang="en-US"/>
+          </a:p>
+        </p:txBody>
+      </p:sp>
     </p:spTree>
     <p:extLst>
       <p:ext uri="{BB962C8B-B14F-4D97-AF65-F5344CB8AC3E}">
@@ -7831,6 +9572,60 @@
           </a:p>
         </p:txBody>
       </p:sp>
+      <p:sp>
+        <p:nvSpPr>
+          <p:cNvPr id="4" name="Footer Placeholder 3">
+            <a:extLst>
+              <a:ext uri="{FF2B5EF4-FFF2-40B4-BE49-F238E27FC236}">
+                <a16:creationId xmlns:a16="http://schemas.microsoft.com/office/drawing/2014/main" id="{9EFBBE12-3005-871A-15B4-D0AD15AD4E39}"/>
+              </a:ext>
+            </a:extLst>
+          </p:cNvPr>
+          <p:cNvSpPr>
+            <a:spLocks noGrp="1"/>
+          </p:cNvSpPr>
+          <p:nvPr>
+            <p:ph type="ftr" sz="quarter" idx="11"/>
+          </p:nvPr>
+        </p:nvSpPr>
+        <p:spPr/>
+        <p:txBody>
+          <a:bodyPr/>
+          <a:lstStyle/>
+          <a:p>
+            <a:endParaRPr lang="en-US"/>
+          </a:p>
+        </p:txBody>
+      </p:sp>
+      <p:sp>
+        <p:nvSpPr>
+          <p:cNvPr id="5" name="Slide Number Placeholder 4">
+            <a:extLst>
+              <a:ext uri="{FF2B5EF4-FFF2-40B4-BE49-F238E27FC236}">
+                <a16:creationId xmlns:a16="http://schemas.microsoft.com/office/drawing/2014/main" id="{50245E59-A59D-0072-D29B-A452DD0C1C22}"/>
+              </a:ext>
+            </a:extLst>
+          </p:cNvPr>
+          <p:cNvSpPr>
+            <a:spLocks noGrp="1"/>
+          </p:cNvSpPr>
+          <p:nvPr>
+            <p:ph type="sldNum" sz="quarter" idx="12"/>
+          </p:nvPr>
+        </p:nvSpPr>
+        <p:spPr/>
+        <p:txBody>
+          <a:bodyPr/>
+          <a:lstStyle/>
+          <a:p>
+            <a:fld id="{62CBAC88-EF5B-3148-888C-824478CD1B05}" type="slidenum">
+              <a:rPr lang="en-US" smtClean="0"/>
+              <a:t>37</a:t>
+            </a:fld>
+            <a:endParaRPr lang="en-US"/>
+          </a:p>
+        </p:txBody>
+      </p:sp>
     </p:spTree>
     <p:extLst>
       <p:ext uri="{BB962C8B-B14F-4D97-AF65-F5344CB8AC3E}">
@@ -7959,6 +9754,60 @@
               <a:rPr lang="en-US" dirty="0"/>
               <a:t>Note: If data changes frequently, caching may not be appropriate</a:t>
             </a:r>
+          </a:p>
+        </p:txBody>
+      </p:sp>
+      <p:sp>
+        <p:nvSpPr>
+          <p:cNvPr id="2" name="Footer Placeholder 1">
+            <a:extLst>
+              <a:ext uri="{FF2B5EF4-FFF2-40B4-BE49-F238E27FC236}">
+                <a16:creationId xmlns:a16="http://schemas.microsoft.com/office/drawing/2014/main" id="{8F51B20B-9884-9640-ED3C-8D2CF5CE38CB}"/>
+              </a:ext>
+            </a:extLst>
+          </p:cNvPr>
+          <p:cNvSpPr>
+            <a:spLocks noGrp="1"/>
+          </p:cNvSpPr>
+          <p:nvPr>
+            <p:ph type="ftr" sz="quarter" idx="11"/>
+          </p:nvPr>
+        </p:nvSpPr>
+        <p:spPr/>
+        <p:txBody>
+          <a:bodyPr/>
+          <a:lstStyle/>
+          <a:p>
+            <a:endParaRPr lang="en-US"/>
+          </a:p>
+        </p:txBody>
+      </p:sp>
+      <p:sp>
+        <p:nvSpPr>
+          <p:cNvPr id="3" name="Slide Number Placeholder 2">
+            <a:extLst>
+              <a:ext uri="{FF2B5EF4-FFF2-40B4-BE49-F238E27FC236}">
+                <a16:creationId xmlns:a16="http://schemas.microsoft.com/office/drawing/2014/main" id="{6720C9BE-1EFA-FF2A-F0F3-FD9BFFC8A3D3}"/>
+              </a:ext>
+            </a:extLst>
+          </p:cNvPr>
+          <p:cNvSpPr>
+            <a:spLocks noGrp="1"/>
+          </p:cNvSpPr>
+          <p:nvPr>
+            <p:ph type="sldNum" sz="quarter" idx="12"/>
+          </p:nvPr>
+        </p:nvSpPr>
+        <p:spPr/>
+        <p:txBody>
+          <a:bodyPr/>
+          <a:lstStyle/>
+          <a:p>
+            <a:fld id="{62CBAC88-EF5B-3148-888C-824478CD1B05}" type="slidenum">
+              <a:rPr lang="en-US" smtClean="0"/>
+              <a:t>38</a:t>
+            </a:fld>
+            <a:endParaRPr lang="en-US"/>
           </a:p>
         </p:txBody>
       </p:sp>
@@ -8272,6 +10121,60 @@
           </a:p>
         </p:txBody>
       </p:sp>
+      <p:sp>
+        <p:nvSpPr>
+          <p:cNvPr id="4" name="Footer Placeholder 3">
+            <a:extLst>
+              <a:ext uri="{FF2B5EF4-FFF2-40B4-BE49-F238E27FC236}">
+                <a16:creationId xmlns:a16="http://schemas.microsoft.com/office/drawing/2014/main" id="{788BA3C5-A5F9-E14D-E442-399110A8A88C}"/>
+              </a:ext>
+            </a:extLst>
+          </p:cNvPr>
+          <p:cNvSpPr>
+            <a:spLocks noGrp="1"/>
+          </p:cNvSpPr>
+          <p:nvPr>
+            <p:ph type="ftr" sz="quarter" idx="11"/>
+          </p:nvPr>
+        </p:nvSpPr>
+        <p:spPr/>
+        <p:txBody>
+          <a:bodyPr/>
+          <a:lstStyle/>
+          <a:p>
+            <a:endParaRPr lang="en-US"/>
+          </a:p>
+        </p:txBody>
+      </p:sp>
+      <p:sp>
+        <p:nvSpPr>
+          <p:cNvPr id="5" name="Slide Number Placeholder 4">
+            <a:extLst>
+              <a:ext uri="{FF2B5EF4-FFF2-40B4-BE49-F238E27FC236}">
+                <a16:creationId xmlns:a16="http://schemas.microsoft.com/office/drawing/2014/main" id="{165F127A-C011-D22F-7BEA-F07783BDE4D4}"/>
+              </a:ext>
+            </a:extLst>
+          </p:cNvPr>
+          <p:cNvSpPr>
+            <a:spLocks noGrp="1"/>
+          </p:cNvSpPr>
+          <p:nvPr>
+            <p:ph type="sldNum" sz="quarter" idx="12"/>
+          </p:nvPr>
+        </p:nvSpPr>
+        <p:spPr/>
+        <p:txBody>
+          <a:bodyPr/>
+          <a:lstStyle/>
+          <a:p>
+            <a:fld id="{62CBAC88-EF5B-3148-888C-824478CD1B05}" type="slidenum">
+              <a:rPr lang="en-US" smtClean="0"/>
+              <a:t>39</a:t>
+            </a:fld>
+            <a:endParaRPr lang="en-US"/>
+          </a:p>
+        </p:txBody>
+      </p:sp>
     </p:spTree>
     <p:extLst>
       <p:ext uri="{BB962C8B-B14F-4D97-AF65-F5344CB8AC3E}">
@@ -8430,6 +10333,63 @@
           </a:p>
         </p:txBody>
       </p:sp>
+      <p:sp>
+        <p:nvSpPr>
+          <p:cNvPr id="4" name="Footer Placeholder 3">
+            <a:extLst>
+              <a:ext uri="{FF2B5EF4-FFF2-40B4-BE49-F238E27FC236}">
+                <a16:creationId xmlns:a16="http://schemas.microsoft.com/office/drawing/2014/main" id="{C4190007-BE00-1420-A4CF-317F766E176D}"/>
+              </a:ext>
+            </a:extLst>
+          </p:cNvPr>
+          <p:cNvSpPr>
+            <a:spLocks noGrp="1"/>
+          </p:cNvSpPr>
+          <p:nvPr>
+            <p:ph type="ftr" sz="quarter" idx="11"/>
+          </p:nvPr>
+        </p:nvSpPr>
+        <p:spPr/>
+        <p:txBody>
+          <a:bodyPr/>
+          <a:lstStyle/>
+          <a:p>
+            <a:r>
+              <a:rPr lang="en-US" dirty="0"/>
+              <a:t>© Steve Beaty and others as cited</a:t>
+            </a:r>
+          </a:p>
+        </p:txBody>
+      </p:sp>
+      <p:sp>
+        <p:nvSpPr>
+          <p:cNvPr id="5" name="Slide Number Placeholder 4">
+            <a:extLst>
+              <a:ext uri="{FF2B5EF4-FFF2-40B4-BE49-F238E27FC236}">
+                <a16:creationId xmlns:a16="http://schemas.microsoft.com/office/drawing/2014/main" id="{F5363098-D876-AC79-6ADA-DC4C6F8AFC4A}"/>
+              </a:ext>
+            </a:extLst>
+          </p:cNvPr>
+          <p:cNvSpPr>
+            <a:spLocks noGrp="1"/>
+          </p:cNvSpPr>
+          <p:nvPr>
+            <p:ph type="sldNum" sz="quarter" idx="12"/>
+          </p:nvPr>
+        </p:nvSpPr>
+        <p:spPr/>
+        <p:txBody>
+          <a:bodyPr/>
+          <a:lstStyle/>
+          <a:p>
+            <a:fld id="{62CBAC88-EF5B-3148-888C-824478CD1B05}" type="slidenum">
+              <a:rPr lang="en-US" smtClean="0"/>
+              <a:t>4</a:t>
+            </a:fld>
+            <a:endParaRPr lang="en-US"/>
+          </a:p>
+        </p:txBody>
+      </p:sp>
     </p:spTree>
     <p:extLst>
       <p:ext uri="{BB962C8B-B14F-4D97-AF65-F5344CB8AC3E}">
@@ -8704,6 +10664,60 @@
           </a:p>
         </p:txBody>
       </p:sp>
+      <p:sp>
+        <p:nvSpPr>
+          <p:cNvPr id="4" name="Footer Placeholder 3">
+            <a:extLst>
+              <a:ext uri="{FF2B5EF4-FFF2-40B4-BE49-F238E27FC236}">
+                <a16:creationId xmlns:a16="http://schemas.microsoft.com/office/drawing/2014/main" id="{DA45BBA0-A150-A4C4-4321-82FB779619D6}"/>
+              </a:ext>
+            </a:extLst>
+          </p:cNvPr>
+          <p:cNvSpPr>
+            <a:spLocks noGrp="1"/>
+          </p:cNvSpPr>
+          <p:nvPr>
+            <p:ph type="ftr" sz="quarter" idx="11"/>
+          </p:nvPr>
+        </p:nvSpPr>
+        <p:spPr/>
+        <p:txBody>
+          <a:bodyPr/>
+          <a:lstStyle/>
+          <a:p>
+            <a:endParaRPr lang="en-US"/>
+          </a:p>
+        </p:txBody>
+      </p:sp>
+      <p:sp>
+        <p:nvSpPr>
+          <p:cNvPr id="5" name="Slide Number Placeholder 4">
+            <a:extLst>
+              <a:ext uri="{FF2B5EF4-FFF2-40B4-BE49-F238E27FC236}">
+                <a16:creationId xmlns:a16="http://schemas.microsoft.com/office/drawing/2014/main" id="{5BEB7E12-180D-BEB0-81E3-67B602E4E3AA}"/>
+              </a:ext>
+            </a:extLst>
+          </p:cNvPr>
+          <p:cNvSpPr>
+            <a:spLocks noGrp="1"/>
+          </p:cNvSpPr>
+          <p:nvPr>
+            <p:ph type="sldNum" sz="quarter" idx="12"/>
+          </p:nvPr>
+        </p:nvSpPr>
+        <p:spPr/>
+        <p:txBody>
+          <a:bodyPr/>
+          <a:lstStyle/>
+          <a:p>
+            <a:fld id="{62CBAC88-EF5B-3148-888C-824478CD1B05}" type="slidenum">
+              <a:rPr lang="en-US" smtClean="0"/>
+              <a:t>40</a:t>
+            </a:fld>
+            <a:endParaRPr lang="en-US"/>
+          </a:p>
+        </p:txBody>
+      </p:sp>
     </p:spTree>
     <p:extLst>
       <p:ext uri="{BB962C8B-B14F-4D97-AF65-F5344CB8AC3E}">
@@ -8841,6 +10855,60 @@
           </a:p>
         </p:txBody>
       </p:sp>
+      <p:sp>
+        <p:nvSpPr>
+          <p:cNvPr id="4" name="Footer Placeholder 3">
+            <a:extLst>
+              <a:ext uri="{FF2B5EF4-FFF2-40B4-BE49-F238E27FC236}">
+                <a16:creationId xmlns:a16="http://schemas.microsoft.com/office/drawing/2014/main" id="{784DF91B-776A-67C6-AD05-23CCFE15C244}"/>
+              </a:ext>
+            </a:extLst>
+          </p:cNvPr>
+          <p:cNvSpPr>
+            <a:spLocks noGrp="1"/>
+          </p:cNvSpPr>
+          <p:nvPr>
+            <p:ph type="ftr" sz="quarter" idx="11"/>
+          </p:nvPr>
+        </p:nvSpPr>
+        <p:spPr/>
+        <p:txBody>
+          <a:bodyPr/>
+          <a:lstStyle/>
+          <a:p>
+            <a:endParaRPr lang="en-US"/>
+          </a:p>
+        </p:txBody>
+      </p:sp>
+      <p:sp>
+        <p:nvSpPr>
+          <p:cNvPr id="5" name="Slide Number Placeholder 4">
+            <a:extLst>
+              <a:ext uri="{FF2B5EF4-FFF2-40B4-BE49-F238E27FC236}">
+                <a16:creationId xmlns:a16="http://schemas.microsoft.com/office/drawing/2014/main" id="{C555B635-98A4-EFDE-B3A4-0EAF14377861}"/>
+              </a:ext>
+            </a:extLst>
+          </p:cNvPr>
+          <p:cNvSpPr>
+            <a:spLocks noGrp="1"/>
+          </p:cNvSpPr>
+          <p:nvPr>
+            <p:ph type="sldNum" sz="quarter" idx="12"/>
+          </p:nvPr>
+        </p:nvSpPr>
+        <p:spPr/>
+        <p:txBody>
+          <a:bodyPr/>
+          <a:lstStyle/>
+          <a:p>
+            <a:fld id="{62CBAC88-EF5B-3148-888C-824478CD1B05}" type="slidenum">
+              <a:rPr lang="en-US" smtClean="0"/>
+              <a:t>41</a:t>
+            </a:fld>
+            <a:endParaRPr lang="en-US"/>
+          </a:p>
+        </p:txBody>
+      </p:sp>
     </p:spTree>
     <p:extLst>
       <p:ext uri="{BB962C8B-B14F-4D97-AF65-F5344CB8AC3E}">
@@ -8986,6 +11054,60 @@
           </a:p>
         </p:txBody>
       </p:sp>
+      <p:sp>
+        <p:nvSpPr>
+          <p:cNvPr id="4" name="Footer Placeholder 3">
+            <a:extLst>
+              <a:ext uri="{FF2B5EF4-FFF2-40B4-BE49-F238E27FC236}">
+                <a16:creationId xmlns:a16="http://schemas.microsoft.com/office/drawing/2014/main" id="{AD15E149-FA05-0271-FCF8-6BFF3431E944}"/>
+              </a:ext>
+            </a:extLst>
+          </p:cNvPr>
+          <p:cNvSpPr>
+            <a:spLocks noGrp="1"/>
+          </p:cNvSpPr>
+          <p:nvPr>
+            <p:ph type="ftr" sz="quarter" idx="11"/>
+          </p:nvPr>
+        </p:nvSpPr>
+        <p:spPr/>
+        <p:txBody>
+          <a:bodyPr/>
+          <a:lstStyle/>
+          <a:p>
+            <a:endParaRPr lang="en-US"/>
+          </a:p>
+        </p:txBody>
+      </p:sp>
+      <p:sp>
+        <p:nvSpPr>
+          <p:cNvPr id="5" name="Slide Number Placeholder 4">
+            <a:extLst>
+              <a:ext uri="{FF2B5EF4-FFF2-40B4-BE49-F238E27FC236}">
+                <a16:creationId xmlns:a16="http://schemas.microsoft.com/office/drawing/2014/main" id="{3A8198EE-72EA-A401-4047-877387FFC0B9}"/>
+              </a:ext>
+            </a:extLst>
+          </p:cNvPr>
+          <p:cNvSpPr>
+            <a:spLocks noGrp="1"/>
+          </p:cNvSpPr>
+          <p:nvPr>
+            <p:ph type="sldNum" sz="quarter" idx="12"/>
+          </p:nvPr>
+        </p:nvSpPr>
+        <p:spPr/>
+        <p:txBody>
+          <a:bodyPr/>
+          <a:lstStyle/>
+          <a:p>
+            <a:fld id="{62CBAC88-EF5B-3148-888C-824478CD1B05}" type="slidenum">
+              <a:rPr lang="en-US" smtClean="0"/>
+              <a:t>42</a:t>
+            </a:fld>
+            <a:endParaRPr lang="en-US"/>
+          </a:p>
+        </p:txBody>
+      </p:sp>
     </p:spTree>
     <p:extLst>
       <p:ext uri="{BB962C8B-B14F-4D97-AF65-F5344CB8AC3E}">
@@ -9120,6 +11242,60 @@
           </a:p>
         </p:txBody>
       </p:sp>
+      <p:sp>
+        <p:nvSpPr>
+          <p:cNvPr id="4" name="Footer Placeholder 3">
+            <a:extLst>
+              <a:ext uri="{FF2B5EF4-FFF2-40B4-BE49-F238E27FC236}">
+                <a16:creationId xmlns:a16="http://schemas.microsoft.com/office/drawing/2014/main" id="{8BA81AF8-5BD9-9D83-8BFE-A0B0EE468A3C}"/>
+              </a:ext>
+            </a:extLst>
+          </p:cNvPr>
+          <p:cNvSpPr>
+            <a:spLocks noGrp="1"/>
+          </p:cNvSpPr>
+          <p:nvPr>
+            <p:ph type="ftr" sz="quarter" idx="11"/>
+          </p:nvPr>
+        </p:nvSpPr>
+        <p:spPr/>
+        <p:txBody>
+          <a:bodyPr/>
+          <a:lstStyle/>
+          <a:p>
+            <a:endParaRPr lang="en-US"/>
+          </a:p>
+        </p:txBody>
+      </p:sp>
+      <p:sp>
+        <p:nvSpPr>
+          <p:cNvPr id="5" name="Slide Number Placeholder 4">
+            <a:extLst>
+              <a:ext uri="{FF2B5EF4-FFF2-40B4-BE49-F238E27FC236}">
+                <a16:creationId xmlns:a16="http://schemas.microsoft.com/office/drawing/2014/main" id="{58900DBB-0915-36BB-A25C-395121806BEF}"/>
+              </a:ext>
+            </a:extLst>
+          </p:cNvPr>
+          <p:cNvSpPr>
+            <a:spLocks noGrp="1"/>
+          </p:cNvSpPr>
+          <p:nvPr>
+            <p:ph type="sldNum" sz="quarter" idx="12"/>
+          </p:nvPr>
+        </p:nvSpPr>
+        <p:spPr/>
+        <p:txBody>
+          <a:bodyPr/>
+          <a:lstStyle/>
+          <a:p>
+            <a:fld id="{62CBAC88-EF5B-3148-888C-824478CD1B05}" type="slidenum">
+              <a:rPr lang="en-US" smtClean="0"/>
+              <a:t>43</a:t>
+            </a:fld>
+            <a:endParaRPr lang="en-US"/>
+          </a:p>
+        </p:txBody>
+      </p:sp>
     </p:spTree>
     <p:extLst>
       <p:ext uri="{BB962C8B-B14F-4D97-AF65-F5344CB8AC3E}">
@@ -9267,6 +11443,60 @@
           </a:p>
         </p:txBody>
       </p:sp>
+      <p:sp>
+        <p:nvSpPr>
+          <p:cNvPr id="4" name="Footer Placeholder 3">
+            <a:extLst>
+              <a:ext uri="{FF2B5EF4-FFF2-40B4-BE49-F238E27FC236}">
+                <a16:creationId xmlns:a16="http://schemas.microsoft.com/office/drawing/2014/main" id="{7039B092-A838-8475-E663-CD203C91C134}"/>
+              </a:ext>
+            </a:extLst>
+          </p:cNvPr>
+          <p:cNvSpPr>
+            <a:spLocks noGrp="1"/>
+          </p:cNvSpPr>
+          <p:nvPr>
+            <p:ph type="ftr" sz="quarter" idx="11"/>
+          </p:nvPr>
+        </p:nvSpPr>
+        <p:spPr/>
+        <p:txBody>
+          <a:bodyPr/>
+          <a:lstStyle/>
+          <a:p>
+            <a:endParaRPr lang="en-US"/>
+          </a:p>
+        </p:txBody>
+      </p:sp>
+      <p:sp>
+        <p:nvSpPr>
+          <p:cNvPr id="5" name="Slide Number Placeholder 4">
+            <a:extLst>
+              <a:ext uri="{FF2B5EF4-FFF2-40B4-BE49-F238E27FC236}">
+                <a16:creationId xmlns:a16="http://schemas.microsoft.com/office/drawing/2014/main" id="{10F1E6F3-BBF9-39AC-831A-9C3DA6CCAAA3}"/>
+              </a:ext>
+            </a:extLst>
+          </p:cNvPr>
+          <p:cNvSpPr>
+            <a:spLocks noGrp="1"/>
+          </p:cNvSpPr>
+          <p:nvPr>
+            <p:ph type="sldNum" sz="quarter" idx="12"/>
+          </p:nvPr>
+        </p:nvSpPr>
+        <p:spPr/>
+        <p:txBody>
+          <a:bodyPr/>
+          <a:lstStyle/>
+          <a:p>
+            <a:fld id="{62CBAC88-EF5B-3148-888C-824478CD1B05}" type="slidenum">
+              <a:rPr lang="en-US" smtClean="0"/>
+              <a:t>44</a:t>
+            </a:fld>
+            <a:endParaRPr lang="en-US"/>
+          </a:p>
+        </p:txBody>
+      </p:sp>
     </p:spTree>
     <p:extLst>
       <p:ext uri="{BB962C8B-B14F-4D97-AF65-F5344CB8AC3E}">
@@ -9423,6 +11653,60 @@
           </a:p>
         </p:txBody>
       </p:sp>
+      <p:sp>
+        <p:nvSpPr>
+          <p:cNvPr id="4" name="Footer Placeholder 3">
+            <a:extLst>
+              <a:ext uri="{FF2B5EF4-FFF2-40B4-BE49-F238E27FC236}">
+                <a16:creationId xmlns:a16="http://schemas.microsoft.com/office/drawing/2014/main" id="{EEB0673F-D8BE-F759-C7BF-4C9E0094E3ED}"/>
+              </a:ext>
+            </a:extLst>
+          </p:cNvPr>
+          <p:cNvSpPr>
+            <a:spLocks noGrp="1"/>
+          </p:cNvSpPr>
+          <p:nvPr>
+            <p:ph type="ftr" sz="quarter" idx="11"/>
+          </p:nvPr>
+        </p:nvSpPr>
+        <p:spPr/>
+        <p:txBody>
+          <a:bodyPr/>
+          <a:lstStyle/>
+          <a:p>
+            <a:endParaRPr lang="en-US"/>
+          </a:p>
+        </p:txBody>
+      </p:sp>
+      <p:sp>
+        <p:nvSpPr>
+          <p:cNvPr id="5" name="Slide Number Placeholder 4">
+            <a:extLst>
+              <a:ext uri="{FF2B5EF4-FFF2-40B4-BE49-F238E27FC236}">
+                <a16:creationId xmlns:a16="http://schemas.microsoft.com/office/drawing/2014/main" id="{4DF2B884-2B11-4054-F40C-F01C2CEFDD82}"/>
+              </a:ext>
+            </a:extLst>
+          </p:cNvPr>
+          <p:cNvSpPr>
+            <a:spLocks noGrp="1"/>
+          </p:cNvSpPr>
+          <p:nvPr>
+            <p:ph type="sldNum" sz="quarter" idx="12"/>
+          </p:nvPr>
+        </p:nvSpPr>
+        <p:spPr/>
+        <p:txBody>
+          <a:bodyPr/>
+          <a:lstStyle/>
+          <a:p>
+            <a:fld id="{62CBAC88-EF5B-3148-888C-824478CD1B05}" type="slidenum">
+              <a:rPr lang="en-US" smtClean="0"/>
+              <a:t>45</a:t>
+            </a:fld>
+            <a:endParaRPr lang="en-US"/>
+          </a:p>
+        </p:txBody>
+      </p:sp>
     </p:spTree>
     <p:extLst>
       <p:ext uri="{BB962C8B-B14F-4D97-AF65-F5344CB8AC3E}">
@@ -9624,6 +11908,60 @@
           </a:p>
         </p:txBody>
       </p:sp>
+      <p:sp>
+        <p:nvSpPr>
+          <p:cNvPr id="4" name="Footer Placeholder 3">
+            <a:extLst>
+              <a:ext uri="{FF2B5EF4-FFF2-40B4-BE49-F238E27FC236}">
+                <a16:creationId xmlns:a16="http://schemas.microsoft.com/office/drawing/2014/main" id="{84A5C5FE-1E0D-AB4E-D5F3-ACAD1420C918}"/>
+              </a:ext>
+            </a:extLst>
+          </p:cNvPr>
+          <p:cNvSpPr>
+            <a:spLocks noGrp="1"/>
+          </p:cNvSpPr>
+          <p:nvPr>
+            <p:ph type="ftr" sz="quarter" idx="11"/>
+          </p:nvPr>
+        </p:nvSpPr>
+        <p:spPr/>
+        <p:txBody>
+          <a:bodyPr/>
+          <a:lstStyle/>
+          <a:p>
+            <a:endParaRPr lang="en-US"/>
+          </a:p>
+        </p:txBody>
+      </p:sp>
+      <p:sp>
+        <p:nvSpPr>
+          <p:cNvPr id="5" name="Slide Number Placeholder 4">
+            <a:extLst>
+              <a:ext uri="{FF2B5EF4-FFF2-40B4-BE49-F238E27FC236}">
+                <a16:creationId xmlns:a16="http://schemas.microsoft.com/office/drawing/2014/main" id="{7DF8AB82-24C9-CA5F-CC11-38DD892BE77B}"/>
+              </a:ext>
+            </a:extLst>
+          </p:cNvPr>
+          <p:cNvSpPr>
+            <a:spLocks noGrp="1"/>
+          </p:cNvSpPr>
+          <p:nvPr>
+            <p:ph type="sldNum" sz="quarter" idx="12"/>
+          </p:nvPr>
+        </p:nvSpPr>
+        <p:spPr/>
+        <p:txBody>
+          <a:bodyPr/>
+          <a:lstStyle/>
+          <a:p>
+            <a:fld id="{62CBAC88-EF5B-3148-888C-824478CD1B05}" type="slidenum">
+              <a:rPr lang="en-US" smtClean="0"/>
+              <a:t>46</a:t>
+            </a:fld>
+            <a:endParaRPr lang="en-US"/>
+          </a:p>
+        </p:txBody>
+      </p:sp>
     </p:spTree>
     <p:extLst>
       <p:ext uri="{BB962C8B-B14F-4D97-AF65-F5344CB8AC3E}">
@@ -9712,12 +12050,7 @@
             <p:ph idx="1"/>
           </p:nvPr>
         </p:nvSpPr>
-        <p:spPr>
-          <a:xfrm>
-            <a:off x="609600" y="1600201"/>
-            <a:ext cx="10972800" cy="4525963"/>
-          </a:xfrm>
-        </p:spPr>
+        <p:spPr/>
         <p:txBody>
           <a:bodyPr>
             <a:normAutofit/>
@@ -9756,6 +12089,60 @@
               <a:rPr lang="en-US" dirty="0"/>
               <a:t>Two defaults: notice and alert</a:t>
             </a:r>
+          </a:p>
+        </p:txBody>
+      </p:sp>
+      <p:sp>
+        <p:nvSpPr>
+          <p:cNvPr id="2" name="Footer Placeholder 1">
+            <a:extLst>
+              <a:ext uri="{FF2B5EF4-FFF2-40B4-BE49-F238E27FC236}">
+                <a16:creationId xmlns:a16="http://schemas.microsoft.com/office/drawing/2014/main" id="{B581C33F-FD2D-CC75-3B65-2AEF8962D85D}"/>
+              </a:ext>
+            </a:extLst>
+          </p:cNvPr>
+          <p:cNvSpPr>
+            <a:spLocks noGrp="1"/>
+          </p:cNvSpPr>
+          <p:nvPr>
+            <p:ph type="ftr" sz="quarter" idx="11"/>
+          </p:nvPr>
+        </p:nvSpPr>
+        <p:spPr/>
+        <p:txBody>
+          <a:bodyPr/>
+          <a:lstStyle/>
+          <a:p>
+            <a:endParaRPr lang="en-US"/>
+          </a:p>
+        </p:txBody>
+      </p:sp>
+      <p:sp>
+        <p:nvSpPr>
+          <p:cNvPr id="3" name="Slide Number Placeholder 2">
+            <a:extLst>
+              <a:ext uri="{FF2B5EF4-FFF2-40B4-BE49-F238E27FC236}">
+                <a16:creationId xmlns:a16="http://schemas.microsoft.com/office/drawing/2014/main" id="{37AEF6E4-6AB0-DFBE-9C15-E423374FC7E6}"/>
+              </a:ext>
+            </a:extLst>
+          </p:cNvPr>
+          <p:cNvSpPr>
+            <a:spLocks noGrp="1"/>
+          </p:cNvSpPr>
+          <p:nvPr>
+            <p:ph type="sldNum" sz="quarter" idx="12"/>
+          </p:nvPr>
+        </p:nvSpPr>
+        <p:spPr/>
+        <p:txBody>
+          <a:bodyPr/>
+          <a:lstStyle/>
+          <a:p>
+            <a:fld id="{62CBAC88-EF5B-3148-888C-824478CD1B05}" type="slidenum">
+              <a:rPr lang="en-US" smtClean="0"/>
+              <a:t>47</a:t>
+            </a:fld>
+            <a:endParaRPr lang="en-US"/>
           </a:p>
         </p:txBody>
       </p:sp>
@@ -9946,6 +12333,60 @@
           </a:p>
         </p:txBody>
       </p:sp>
+      <p:sp>
+        <p:nvSpPr>
+          <p:cNvPr id="4" name="Footer Placeholder 3">
+            <a:extLst>
+              <a:ext uri="{FF2B5EF4-FFF2-40B4-BE49-F238E27FC236}">
+                <a16:creationId xmlns:a16="http://schemas.microsoft.com/office/drawing/2014/main" id="{0E3C242B-5028-1454-22BA-69FF19DF3291}"/>
+              </a:ext>
+            </a:extLst>
+          </p:cNvPr>
+          <p:cNvSpPr>
+            <a:spLocks noGrp="1"/>
+          </p:cNvSpPr>
+          <p:nvPr>
+            <p:ph type="ftr" sz="quarter" idx="11"/>
+          </p:nvPr>
+        </p:nvSpPr>
+        <p:spPr/>
+        <p:txBody>
+          <a:bodyPr/>
+          <a:lstStyle/>
+          <a:p>
+            <a:endParaRPr lang="en-US"/>
+          </a:p>
+        </p:txBody>
+      </p:sp>
+      <p:sp>
+        <p:nvSpPr>
+          <p:cNvPr id="5" name="Slide Number Placeholder 4">
+            <a:extLst>
+              <a:ext uri="{FF2B5EF4-FFF2-40B4-BE49-F238E27FC236}">
+                <a16:creationId xmlns:a16="http://schemas.microsoft.com/office/drawing/2014/main" id="{2FC6C047-6E37-B5DA-194C-B4B777DC0C98}"/>
+              </a:ext>
+            </a:extLst>
+          </p:cNvPr>
+          <p:cNvSpPr>
+            <a:spLocks noGrp="1"/>
+          </p:cNvSpPr>
+          <p:nvPr>
+            <p:ph type="sldNum" sz="quarter" idx="12"/>
+          </p:nvPr>
+        </p:nvSpPr>
+        <p:spPr/>
+        <p:txBody>
+          <a:bodyPr/>
+          <a:lstStyle/>
+          <a:p>
+            <a:fld id="{62CBAC88-EF5B-3148-888C-824478CD1B05}" type="slidenum">
+              <a:rPr lang="en-US" smtClean="0"/>
+              <a:t>48</a:t>
+            </a:fld>
+            <a:endParaRPr lang="en-US"/>
+          </a:p>
+        </p:txBody>
+      </p:sp>
     </p:spTree>
     <p:extLst>
       <p:ext uri="{BB962C8B-B14F-4D97-AF65-F5344CB8AC3E}">
@@ -10107,6 +12548,60 @@
           </a:p>
         </p:txBody>
       </p:sp>
+      <p:sp>
+        <p:nvSpPr>
+          <p:cNvPr id="4" name="Footer Placeholder 3">
+            <a:extLst>
+              <a:ext uri="{FF2B5EF4-FFF2-40B4-BE49-F238E27FC236}">
+                <a16:creationId xmlns:a16="http://schemas.microsoft.com/office/drawing/2014/main" id="{050B5E34-B816-4371-3758-4090E924820F}"/>
+              </a:ext>
+            </a:extLst>
+          </p:cNvPr>
+          <p:cNvSpPr>
+            <a:spLocks noGrp="1"/>
+          </p:cNvSpPr>
+          <p:nvPr>
+            <p:ph type="ftr" sz="quarter" idx="11"/>
+          </p:nvPr>
+        </p:nvSpPr>
+        <p:spPr/>
+        <p:txBody>
+          <a:bodyPr/>
+          <a:lstStyle/>
+          <a:p>
+            <a:endParaRPr lang="en-US"/>
+          </a:p>
+        </p:txBody>
+      </p:sp>
+      <p:sp>
+        <p:nvSpPr>
+          <p:cNvPr id="5" name="Slide Number Placeholder 4">
+            <a:extLst>
+              <a:ext uri="{FF2B5EF4-FFF2-40B4-BE49-F238E27FC236}">
+                <a16:creationId xmlns:a16="http://schemas.microsoft.com/office/drawing/2014/main" id="{079DE7B7-A9B6-F0D6-6158-D63F330C46A7}"/>
+              </a:ext>
+            </a:extLst>
+          </p:cNvPr>
+          <p:cNvSpPr>
+            <a:spLocks noGrp="1"/>
+          </p:cNvSpPr>
+          <p:nvPr>
+            <p:ph type="sldNum" sz="quarter" idx="12"/>
+          </p:nvPr>
+        </p:nvSpPr>
+        <p:spPr/>
+        <p:txBody>
+          <a:bodyPr/>
+          <a:lstStyle/>
+          <a:p>
+            <a:fld id="{62CBAC88-EF5B-3148-888C-824478CD1B05}" type="slidenum">
+              <a:rPr lang="en-US" smtClean="0"/>
+              <a:t>49</a:t>
+            </a:fld>
+            <a:endParaRPr lang="en-US"/>
+          </a:p>
+        </p:txBody>
+      </p:sp>
     </p:spTree>
     <p:extLst>
       <p:ext uri="{BB962C8B-B14F-4D97-AF65-F5344CB8AC3E}">
@@ -10232,6 +12727,60 @@
           </a:p>
           <a:p>
             <a:endParaRPr lang="en-US" dirty="0"/>
+          </a:p>
+        </p:txBody>
+      </p:sp>
+      <p:sp>
+        <p:nvSpPr>
+          <p:cNvPr id="4" name="Footer Placeholder 3">
+            <a:extLst>
+              <a:ext uri="{FF2B5EF4-FFF2-40B4-BE49-F238E27FC236}">
+                <a16:creationId xmlns:a16="http://schemas.microsoft.com/office/drawing/2014/main" id="{FB6F2A00-A0E5-8464-7F9F-97301F7962B5}"/>
+              </a:ext>
+            </a:extLst>
+          </p:cNvPr>
+          <p:cNvSpPr>
+            <a:spLocks noGrp="1"/>
+          </p:cNvSpPr>
+          <p:nvPr>
+            <p:ph type="ftr" sz="quarter" idx="11"/>
+          </p:nvPr>
+        </p:nvSpPr>
+        <p:spPr/>
+        <p:txBody>
+          <a:bodyPr/>
+          <a:lstStyle/>
+          <a:p>
+            <a:endParaRPr lang="en-US"/>
+          </a:p>
+        </p:txBody>
+      </p:sp>
+      <p:sp>
+        <p:nvSpPr>
+          <p:cNvPr id="5" name="Slide Number Placeholder 4">
+            <a:extLst>
+              <a:ext uri="{FF2B5EF4-FFF2-40B4-BE49-F238E27FC236}">
+                <a16:creationId xmlns:a16="http://schemas.microsoft.com/office/drawing/2014/main" id="{B6A7B0B4-5E14-8918-6F38-B25837A31327}"/>
+              </a:ext>
+            </a:extLst>
+          </p:cNvPr>
+          <p:cNvSpPr>
+            <a:spLocks noGrp="1"/>
+          </p:cNvSpPr>
+          <p:nvPr>
+            <p:ph type="sldNum" sz="quarter" idx="12"/>
+          </p:nvPr>
+        </p:nvSpPr>
+        <p:spPr/>
+        <p:txBody>
+          <a:bodyPr/>
+          <a:lstStyle/>
+          <a:p>
+            <a:fld id="{62CBAC88-EF5B-3148-888C-824478CD1B05}" type="slidenum">
+              <a:rPr lang="en-US" smtClean="0"/>
+              <a:t>5</a:t>
+            </a:fld>
+            <a:endParaRPr lang="en-US"/>
           </a:p>
         </p:txBody>
       </p:sp>
@@ -10454,6 +13003,60 @@
           </a:p>
         </p:txBody>
       </p:sp>
+      <p:sp>
+        <p:nvSpPr>
+          <p:cNvPr id="4" name="Footer Placeholder 3">
+            <a:extLst>
+              <a:ext uri="{FF2B5EF4-FFF2-40B4-BE49-F238E27FC236}">
+                <a16:creationId xmlns:a16="http://schemas.microsoft.com/office/drawing/2014/main" id="{88D009F6-20D5-6889-E7E5-642E9C756C83}"/>
+              </a:ext>
+            </a:extLst>
+          </p:cNvPr>
+          <p:cNvSpPr>
+            <a:spLocks noGrp="1"/>
+          </p:cNvSpPr>
+          <p:nvPr>
+            <p:ph type="ftr" sz="quarter" idx="11"/>
+          </p:nvPr>
+        </p:nvSpPr>
+        <p:spPr/>
+        <p:txBody>
+          <a:bodyPr/>
+          <a:lstStyle/>
+          <a:p>
+            <a:endParaRPr lang="en-US"/>
+          </a:p>
+        </p:txBody>
+      </p:sp>
+      <p:sp>
+        <p:nvSpPr>
+          <p:cNvPr id="5" name="Slide Number Placeholder 4">
+            <a:extLst>
+              <a:ext uri="{FF2B5EF4-FFF2-40B4-BE49-F238E27FC236}">
+                <a16:creationId xmlns:a16="http://schemas.microsoft.com/office/drawing/2014/main" id="{2D48CD21-FE62-157D-E901-F09C12C54426}"/>
+              </a:ext>
+            </a:extLst>
+          </p:cNvPr>
+          <p:cNvSpPr>
+            <a:spLocks noGrp="1"/>
+          </p:cNvSpPr>
+          <p:nvPr>
+            <p:ph type="sldNum" sz="quarter" idx="12"/>
+          </p:nvPr>
+        </p:nvSpPr>
+        <p:spPr/>
+        <p:txBody>
+          <a:bodyPr/>
+          <a:lstStyle/>
+          <a:p>
+            <a:fld id="{62CBAC88-EF5B-3148-888C-824478CD1B05}" type="slidenum">
+              <a:rPr lang="en-US" smtClean="0"/>
+              <a:t>50</a:t>
+            </a:fld>
+            <a:endParaRPr lang="en-US"/>
+          </a:p>
+        </p:txBody>
+      </p:sp>
     </p:spTree>
     <p:extLst>
       <p:ext uri="{BB962C8B-B14F-4D97-AF65-F5344CB8AC3E}">
@@ -10590,6 +13193,60 @@
           </a:p>
         </p:txBody>
       </p:sp>
+      <p:sp>
+        <p:nvSpPr>
+          <p:cNvPr id="4" name="Footer Placeholder 3">
+            <a:extLst>
+              <a:ext uri="{FF2B5EF4-FFF2-40B4-BE49-F238E27FC236}">
+                <a16:creationId xmlns:a16="http://schemas.microsoft.com/office/drawing/2014/main" id="{3D465729-BBAE-B781-0386-AFEDED35720F}"/>
+              </a:ext>
+            </a:extLst>
+          </p:cNvPr>
+          <p:cNvSpPr>
+            <a:spLocks noGrp="1"/>
+          </p:cNvSpPr>
+          <p:nvPr>
+            <p:ph type="ftr" sz="quarter" idx="11"/>
+          </p:nvPr>
+        </p:nvSpPr>
+        <p:spPr/>
+        <p:txBody>
+          <a:bodyPr/>
+          <a:lstStyle/>
+          <a:p>
+            <a:endParaRPr lang="en-US"/>
+          </a:p>
+        </p:txBody>
+      </p:sp>
+      <p:sp>
+        <p:nvSpPr>
+          <p:cNvPr id="5" name="Slide Number Placeholder 4">
+            <a:extLst>
+              <a:ext uri="{FF2B5EF4-FFF2-40B4-BE49-F238E27FC236}">
+                <a16:creationId xmlns:a16="http://schemas.microsoft.com/office/drawing/2014/main" id="{F91D2FFF-C543-BA13-D5F5-5E3833E7037E}"/>
+              </a:ext>
+            </a:extLst>
+          </p:cNvPr>
+          <p:cNvSpPr>
+            <a:spLocks noGrp="1"/>
+          </p:cNvSpPr>
+          <p:nvPr>
+            <p:ph type="sldNum" sz="quarter" idx="12"/>
+          </p:nvPr>
+        </p:nvSpPr>
+        <p:spPr/>
+        <p:txBody>
+          <a:bodyPr/>
+          <a:lstStyle/>
+          <a:p>
+            <a:fld id="{62CBAC88-EF5B-3148-888C-824478CD1B05}" type="slidenum">
+              <a:rPr lang="en-US" smtClean="0"/>
+              <a:t>51</a:t>
+            </a:fld>
+            <a:endParaRPr lang="en-US"/>
+          </a:p>
+        </p:txBody>
+      </p:sp>
     </p:spTree>
     <p:extLst>
       <p:ext uri="{BB962C8B-B14F-4D97-AF65-F5344CB8AC3E}">
@@ -10827,6 +13484,60 @@
           </a:p>
         </p:txBody>
       </p:sp>
+      <p:sp>
+        <p:nvSpPr>
+          <p:cNvPr id="4" name="Footer Placeholder 3">
+            <a:extLst>
+              <a:ext uri="{FF2B5EF4-FFF2-40B4-BE49-F238E27FC236}">
+                <a16:creationId xmlns:a16="http://schemas.microsoft.com/office/drawing/2014/main" id="{40F55AEB-FAC8-A431-7156-F21B7D28426D}"/>
+              </a:ext>
+            </a:extLst>
+          </p:cNvPr>
+          <p:cNvSpPr>
+            <a:spLocks noGrp="1"/>
+          </p:cNvSpPr>
+          <p:nvPr>
+            <p:ph type="ftr" sz="quarter" idx="11"/>
+          </p:nvPr>
+        </p:nvSpPr>
+        <p:spPr/>
+        <p:txBody>
+          <a:bodyPr/>
+          <a:lstStyle/>
+          <a:p>
+            <a:endParaRPr lang="en-US"/>
+          </a:p>
+        </p:txBody>
+      </p:sp>
+      <p:sp>
+        <p:nvSpPr>
+          <p:cNvPr id="5" name="Slide Number Placeholder 4">
+            <a:extLst>
+              <a:ext uri="{FF2B5EF4-FFF2-40B4-BE49-F238E27FC236}">
+                <a16:creationId xmlns:a16="http://schemas.microsoft.com/office/drawing/2014/main" id="{D9C5DB47-0B31-3903-07D9-C434926B5752}"/>
+              </a:ext>
+            </a:extLst>
+          </p:cNvPr>
+          <p:cNvSpPr>
+            <a:spLocks noGrp="1"/>
+          </p:cNvSpPr>
+          <p:nvPr>
+            <p:ph type="sldNum" sz="quarter" idx="12"/>
+          </p:nvPr>
+        </p:nvSpPr>
+        <p:spPr/>
+        <p:txBody>
+          <a:bodyPr/>
+          <a:lstStyle/>
+          <a:p>
+            <a:fld id="{62CBAC88-EF5B-3148-888C-824478CD1B05}" type="slidenum">
+              <a:rPr lang="en-US" smtClean="0"/>
+              <a:t>52</a:t>
+            </a:fld>
+            <a:endParaRPr lang="en-US"/>
+          </a:p>
+        </p:txBody>
+      </p:sp>
     </p:spTree>
     <p:extLst>
       <p:ext uri="{BB962C8B-B14F-4D97-AF65-F5344CB8AC3E}">
@@ -10987,6 +13698,60 @@
           </a:p>
         </p:txBody>
       </p:sp>
+      <p:sp>
+        <p:nvSpPr>
+          <p:cNvPr id="4" name="Footer Placeholder 3">
+            <a:extLst>
+              <a:ext uri="{FF2B5EF4-FFF2-40B4-BE49-F238E27FC236}">
+                <a16:creationId xmlns:a16="http://schemas.microsoft.com/office/drawing/2014/main" id="{FB5D15E1-F737-3532-7F3F-720E6FEE0829}"/>
+              </a:ext>
+            </a:extLst>
+          </p:cNvPr>
+          <p:cNvSpPr>
+            <a:spLocks noGrp="1"/>
+          </p:cNvSpPr>
+          <p:nvPr>
+            <p:ph type="ftr" sz="quarter" idx="11"/>
+          </p:nvPr>
+        </p:nvSpPr>
+        <p:spPr/>
+        <p:txBody>
+          <a:bodyPr/>
+          <a:lstStyle/>
+          <a:p>
+            <a:endParaRPr lang="en-US"/>
+          </a:p>
+        </p:txBody>
+      </p:sp>
+      <p:sp>
+        <p:nvSpPr>
+          <p:cNvPr id="5" name="Slide Number Placeholder 4">
+            <a:extLst>
+              <a:ext uri="{FF2B5EF4-FFF2-40B4-BE49-F238E27FC236}">
+                <a16:creationId xmlns:a16="http://schemas.microsoft.com/office/drawing/2014/main" id="{EE403491-137E-15E5-25EA-A046940A70D7}"/>
+              </a:ext>
+            </a:extLst>
+          </p:cNvPr>
+          <p:cNvSpPr>
+            <a:spLocks noGrp="1"/>
+          </p:cNvSpPr>
+          <p:nvPr>
+            <p:ph type="sldNum" sz="quarter" idx="12"/>
+          </p:nvPr>
+        </p:nvSpPr>
+        <p:spPr/>
+        <p:txBody>
+          <a:bodyPr/>
+          <a:lstStyle/>
+          <a:p>
+            <a:fld id="{62CBAC88-EF5B-3148-888C-824478CD1B05}" type="slidenum">
+              <a:rPr lang="en-US" smtClean="0"/>
+              <a:t>53</a:t>
+            </a:fld>
+            <a:endParaRPr lang="en-US"/>
+          </a:p>
+        </p:txBody>
+      </p:sp>
     </p:spTree>
     <p:extLst>
       <p:ext uri="{BB962C8B-B14F-4D97-AF65-F5344CB8AC3E}">
@@ -11118,6 +13883,60 @@
           </a:p>
         </p:txBody>
       </p:sp>
+      <p:sp>
+        <p:nvSpPr>
+          <p:cNvPr id="4" name="Footer Placeholder 3">
+            <a:extLst>
+              <a:ext uri="{FF2B5EF4-FFF2-40B4-BE49-F238E27FC236}">
+                <a16:creationId xmlns:a16="http://schemas.microsoft.com/office/drawing/2014/main" id="{B2EDD956-E17C-54D6-AFEE-91D4C53B5268}"/>
+              </a:ext>
+            </a:extLst>
+          </p:cNvPr>
+          <p:cNvSpPr>
+            <a:spLocks noGrp="1"/>
+          </p:cNvSpPr>
+          <p:nvPr>
+            <p:ph type="ftr" sz="quarter" idx="11"/>
+          </p:nvPr>
+        </p:nvSpPr>
+        <p:spPr/>
+        <p:txBody>
+          <a:bodyPr/>
+          <a:lstStyle/>
+          <a:p>
+            <a:endParaRPr lang="en-US"/>
+          </a:p>
+        </p:txBody>
+      </p:sp>
+      <p:sp>
+        <p:nvSpPr>
+          <p:cNvPr id="5" name="Slide Number Placeholder 4">
+            <a:extLst>
+              <a:ext uri="{FF2B5EF4-FFF2-40B4-BE49-F238E27FC236}">
+                <a16:creationId xmlns:a16="http://schemas.microsoft.com/office/drawing/2014/main" id="{6082B8C3-E608-655B-FFF6-211DF57AC4D0}"/>
+              </a:ext>
+            </a:extLst>
+          </p:cNvPr>
+          <p:cNvSpPr>
+            <a:spLocks noGrp="1"/>
+          </p:cNvSpPr>
+          <p:nvPr>
+            <p:ph type="sldNum" sz="quarter" idx="12"/>
+          </p:nvPr>
+        </p:nvSpPr>
+        <p:spPr/>
+        <p:txBody>
+          <a:bodyPr/>
+          <a:lstStyle/>
+          <a:p>
+            <a:fld id="{62CBAC88-EF5B-3148-888C-824478CD1B05}" type="slidenum">
+              <a:rPr lang="en-US" smtClean="0"/>
+              <a:t>54</a:t>
+            </a:fld>
+            <a:endParaRPr lang="en-US"/>
+          </a:p>
+        </p:txBody>
+      </p:sp>
     </p:spTree>
     <p:extLst>
       <p:ext uri="{BB962C8B-B14F-4D97-AF65-F5344CB8AC3E}">
@@ -11254,6 +14073,60 @@
           </a:p>
         </p:txBody>
       </p:sp>
+      <p:sp>
+        <p:nvSpPr>
+          <p:cNvPr id="4" name="Footer Placeholder 3">
+            <a:extLst>
+              <a:ext uri="{FF2B5EF4-FFF2-40B4-BE49-F238E27FC236}">
+                <a16:creationId xmlns:a16="http://schemas.microsoft.com/office/drawing/2014/main" id="{589496D9-4BCC-908A-C18B-BC7F1ACAF429}"/>
+              </a:ext>
+            </a:extLst>
+          </p:cNvPr>
+          <p:cNvSpPr>
+            <a:spLocks noGrp="1"/>
+          </p:cNvSpPr>
+          <p:nvPr>
+            <p:ph type="ftr" sz="quarter" idx="11"/>
+          </p:nvPr>
+        </p:nvSpPr>
+        <p:spPr/>
+        <p:txBody>
+          <a:bodyPr/>
+          <a:lstStyle/>
+          <a:p>
+            <a:endParaRPr lang="en-US"/>
+          </a:p>
+        </p:txBody>
+      </p:sp>
+      <p:sp>
+        <p:nvSpPr>
+          <p:cNvPr id="5" name="Slide Number Placeholder 4">
+            <a:extLst>
+              <a:ext uri="{FF2B5EF4-FFF2-40B4-BE49-F238E27FC236}">
+                <a16:creationId xmlns:a16="http://schemas.microsoft.com/office/drawing/2014/main" id="{754333F6-3F56-781C-B62E-AD6750B089C7}"/>
+              </a:ext>
+            </a:extLst>
+          </p:cNvPr>
+          <p:cNvSpPr>
+            <a:spLocks noGrp="1"/>
+          </p:cNvSpPr>
+          <p:nvPr>
+            <p:ph type="sldNum" sz="quarter" idx="12"/>
+          </p:nvPr>
+        </p:nvSpPr>
+        <p:spPr/>
+        <p:txBody>
+          <a:bodyPr/>
+          <a:lstStyle/>
+          <a:p>
+            <a:fld id="{62CBAC88-EF5B-3148-888C-824478CD1B05}" type="slidenum">
+              <a:rPr lang="en-US" smtClean="0"/>
+              <a:t>55</a:t>
+            </a:fld>
+            <a:endParaRPr lang="en-US"/>
+          </a:p>
+        </p:txBody>
+      </p:sp>
     </p:spTree>
     <p:extLst>
       <p:ext uri="{BB962C8B-B14F-4D97-AF65-F5344CB8AC3E}">
@@ -11480,6 +14353,60 @@
           </a:p>
         </p:txBody>
       </p:sp>
+      <p:sp>
+        <p:nvSpPr>
+          <p:cNvPr id="4" name="Footer Placeholder 3">
+            <a:extLst>
+              <a:ext uri="{FF2B5EF4-FFF2-40B4-BE49-F238E27FC236}">
+                <a16:creationId xmlns:a16="http://schemas.microsoft.com/office/drawing/2014/main" id="{13AF9C23-85E4-1E8C-FB7D-CB34749083C8}"/>
+              </a:ext>
+            </a:extLst>
+          </p:cNvPr>
+          <p:cNvSpPr>
+            <a:spLocks noGrp="1"/>
+          </p:cNvSpPr>
+          <p:nvPr>
+            <p:ph type="ftr" sz="quarter" idx="11"/>
+          </p:nvPr>
+        </p:nvSpPr>
+        <p:spPr/>
+        <p:txBody>
+          <a:bodyPr/>
+          <a:lstStyle/>
+          <a:p>
+            <a:endParaRPr lang="en-US"/>
+          </a:p>
+        </p:txBody>
+      </p:sp>
+      <p:sp>
+        <p:nvSpPr>
+          <p:cNvPr id="5" name="Slide Number Placeholder 4">
+            <a:extLst>
+              <a:ext uri="{FF2B5EF4-FFF2-40B4-BE49-F238E27FC236}">
+                <a16:creationId xmlns:a16="http://schemas.microsoft.com/office/drawing/2014/main" id="{E5D6B649-CA8A-FC9D-D384-A3D98F417398}"/>
+              </a:ext>
+            </a:extLst>
+          </p:cNvPr>
+          <p:cNvSpPr>
+            <a:spLocks noGrp="1"/>
+          </p:cNvSpPr>
+          <p:nvPr>
+            <p:ph type="sldNum" sz="quarter" idx="12"/>
+          </p:nvPr>
+        </p:nvSpPr>
+        <p:spPr/>
+        <p:txBody>
+          <a:bodyPr/>
+          <a:lstStyle/>
+          <a:p>
+            <a:fld id="{62CBAC88-EF5B-3148-888C-824478CD1B05}" type="slidenum">
+              <a:rPr lang="en-US" smtClean="0"/>
+              <a:t>56</a:t>
+            </a:fld>
+            <a:endParaRPr lang="en-US"/>
+          </a:p>
+        </p:txBody>
+      </p:sp>
     </p:spTree>
     <p:extLst>
       <p:ext uri="{BB962C8B-B14F-4D97-AF65-F5344CB8AC3E}">
@@ -11633,6 +14560,60 @@
           </a:p>
         </p:txBody>
       </p:sp>
+      <p:sp>
+        <p:nvSpPr>
+          <p:cNvPr id="4" name="Footer Placeholder 3">
+            <a:extLst>
+              <a:ext uri="{FF2B5EF4-FFF2-40B4-BE49-F238E27FC236}">
+                <a16:creationId xmlns:a16="http://schemas.microsoft.com/office/drawing/2014/main" id="{A0F9B6FD-8D0B-EC80-08D0-35FD31CBF6FC}"/>
+              </a:ext>
+            </a:extLst>
+          </p:cNvPr>
+          <p:cNvSpPr>
+            <a:spLocks noGrp="1"/>
+          </p:cNvSpPr>
+          <p:nvPr>
+            <p:ph type="ftr" sz="quarter" idx="11"/>
+          </p:nvPr>
+        </p:nvSpPr>
+        <p:spPr/>
+        <p:txBody>
+          <a:bodyPr/>
+          <a:lstStyle/>
+          <a:p>
+            <a:endParaRPr lang="en-US"/>
+          </a:p>
+        </p:txBody>
+      </p:sp>
+      <p:sp>
+        <p:nvSpPr>
+          <p:cNvPr id="5" name="Slide Number Placeholder 4">
+            <a:extLst>
+              <a:ext uri="{FF2B5EF4-FFF2-40B4-BE49-F238E27FC236}">
+                <a16:creationId xmlns:a16="http://schemas.microsoft.com/office/drawing/2014/main" id="{C75FE7F8-E761-EF1A-EF5E-A29B5F13AAC3}"/>
+              </a:ext>
+            </a:extLst>
+          </p:cNvPr>
+          <p:cNvSpPr>
+            <a:spLocks noGrp="1"/>
+          </p:cNvSpPr>
+          <p:nvPr>
+            <p:ph type="sldNum" sz="quarter" idx="12"/>
+          </p:nvPr>
+        </p:nvSpPr>
+        <p:spPr/>
+        <p:txBody>
+          <a:bodyPr/>
+          <a:lstStyle/>
+          <a:p>
+            <a:fld id="{62CBAC88-EF5B-3148-888C-824478CD1B05}" type="slidenum">
+              <a:rPr lang="en-US" smtClean="0"/>
+              <a:t>57</a:t>
+            </a:fld>
+            <a:endParaRPr lang="en-US"/>
+          </a:p>
+        </p:txBody>
+      </p:sp>
     </p:spTree>
     <p:extLst>
       <p:ext uri="{BB962C8B-B14F-4D97-AF65-F5344CB8AC3E}">
@@ -11766,6 +14747,60 @@
           </a:p>
         </p:txBody>
       </p:sp>
+      <p:sp>
+        <p:nvSpPr>
+          <p:cNvPr id="4" name="Footer Placeholder 3">
+            <a:extLst>
+              <a:ext uri="{FF2B5EF4-FFF2-40B4-BE49-F238E27FC236}">
+                <a16:creationId xmlns:a16="http://schemas.microsoft.com/office/drawing/2014/main" id="{31FA7BBA-243A-150E-7F10-A092F8187AC6}"/>
+              </a:ext>
+            </a:extLst>
+          </p:cNvPr>
+          <p:cNvSpPr>
+            <a:spLocks noGrp="1"/>
+          </p:cNvSpPr>
+          <p:nvPr>
+            <p:ph type="ftr" sz="quarter" idx="11"/>
+          </p:nvPr>
+        </p:nvSpPr>
+        <p:spPr/>
+        <p:txBody>
+          <a:bodyPr/>
+          <a:lstStyle/>
+          <a:p>
+            <a:endParaRPr lang="en-US"/>
+          </a:p>
+        </p:txBody>
+      </p:sp>
+      <p:sp>
+        <p:nvSpPr>
+          <p:cNvPr id="5" name="Slide Number Placeholder 4">
+            <a:extLst>
+              <a:ext uri="{FF2B5EF4-FFF2-40B4-BE49-F238E27FC236}">
+                <a16:creationId xmlns:a16="http://schemas.microsoft.com/office/drawing/2014/main" id="{CB0A5439-E41A-F0C8-1F68-5B239C7A658B}"/>
+              </a:ext>
+            </a:extLst>
+          </p:cNvPr>
+          <p:cNvSpPr>
+            <a:spLocks noGrp="1"/>
+          </p:cNvSpPr>
+          <p:nvPr>
+            <p:ph type="sldNum" sz="quarter" idx="12"/>
+          </p:nvPr>
+        </p:nvSpPr>
+        <p:spPr/>
+        <p:txBody>
+          <a:bodyPr/>
+          <a:lstStyle/>
+          <a:p>
+            <a:fld id="{62CBAC88-EF5B-3148-888C-824478CD1B05}" type="slidenum">
+              <a:rPr lang="en-US" smtClean="0"/>
+              <a:t>58</a:t>
+            </a:fld>
+            <a:endParaRPr lang="en-US"/>
+          </a:p>
+        </p:txBody>
+      </p:sp>
     </p:spTree>
     <p:extLst>
       <p:ext uri="{BB962C8B-B14F-4D97-AF65-F5344CB8AC3E}">
@@ -11899,6 +14934,60 @@
           </a:p>
         </p:txBody>
       </p:sp>
+      <p:sp>
+        <p:nvSpPr>
+          <p:cNvPr id="4" name="Footer Placeholder 3">
+            <a:extLst>
+              <a:ext uri="{FF2B5EF4-FFF2-40B4-BE49-F238E27FC236}">
+                <a16:creationId xmlns:a16="http://schemas.microsoft.com/office/drawing/2014/main" id="{1F783C2D-4A89-63EF-9583-23231822B0D3}"/>
+              </a:ext>
+            </a:extLst>
+          </p:cNvPr>
+          <p:cNvSpPr>
+            <a:spLocks noGrp="1"/>
+          </p:cNvSpPr>
+          <p:nvPr>
+            <p:ph type="ftr" sz="quarter" idx="11"/>
+          </p:nvPr>
+        </p:nvSpPr>
+        <p:spPr/>
+        <p:txBody>
+          <a:bodyPr/>
+          <a:lstStyle/>
+          <a:p>
+            <a:endParaRPr lang="en-US"/>
+          </a:p>
+        </p:txBody>
+      </p:sp>
+      <p:sp>
+        <p:nvSpPr>
+          <p:cNvPr id="5" name="Slide Number Placeholder 4">
+            <a:extLst>
+              <a:ext uri="{FF2B5EF4-FFF2-40B4-BE49-F238E27FC236}">
+                <a16:creationId xmlns:a16="http://schemas.microsoft.com/office/drawing/2014/main" id="{89A1C510-00D2-FDED-091C-CFF4CD88DE52}"/>
+              </a:ext>
+            </a:extLst>
+          </p:cNvPr>
+          <p:cNvSpPr>
+            <a:spLocks noGrp="1"/>
+          </p:cNvSpPr>
+          <p:nvPr>
+            <p:ph type="sldNum" sz="quarter" idx="12"/>
+          </p:nvPr>
+        </p:nvSpPr>
+        <p:spPr/>
+        <p:txBody>
+          <a:bodyPr/>
+          <a:lstStyle/>
+          <a:p>
+            <a:fld id="{62CBAC88-EF5B-3148-888C-824478CD1B05}" type="slidenum">
+              <a:rPr lang="en-US" smtClean="0"/>
+              <a:t>59</a:t>
+            </a:fld>
+            <a:endParaRPr lang="en-US"/>
+          </a:p>
+        </p:txBody>
+      </p:sp>
     </p:spTree>
     <p:extLst>
       <p:ext uri="{BB962C8B-B14F-4D97-AF65-F5344CB8AC3E}">
@@ -12032,6 +15121,60 @@
           </a:p>
         </p:txBody>
       </p:sp>
+      <p:sp>
+        <p:nvSpPr>
+          <p:cNvPr id="4" name="Footer Placeholder 3">
+            <a:extLst>
+              <a:ext uri="{FF2B5EF4-FFF2-40B4-BE49-F238E27FC236}">
+                <a16:creationId xmlns:a16="http://schemas.microsoft.com/office/drawing/2014/main" id="{EC479797-B011-70FA-181D-D08BABA96C4D}"/>
+              </a:ext>
+            </a:extLst>
+          </p:cNvPr>
+          <p:cNvSpPr>
+            <a:spLocks noGrp="1"/>
+          </p:cNvSpPr>
+          <p:nvPr>
+            <p:ph type="ftr" sz="quarter" idx="11"/>
+          </p:nvPr>
+        </p:nvSpPr>
+        <p:spPr/>
+        <p:txBody>
+          <a:bodyPr/>
+          <a:lstStyle/>
+          <a:p>
+            <a:endParaRPr lang="en-US"/>
+          </a:p>
+        </p:txBody>
+      </p:sp>
+      <p:sp>
+        <p:nvSpPr>
+          <p:cNvPr id="5" name="Slide Number Placeholder 4">
+            <a:extLst>
+              <a:ext uri="{FF2B5EF4-FFF2-40B4-BE49-F238E27FC236}">
+                <a16:creationId xmlns:a16="http://schemas.microsoft.com/office/drawing/2014/main" id="{E6EA353F-0B8D-EEE4-ABB1-9682D9D5396F}"/>
+              </a:ext>
+            </a:extLst>
+          </p:cNvPr>
+          <p:cNvSpPr>
+            <a:spLocks noGrp="1"/>
+          </p:cNvSpPr>
+          <p:nvPr>
+            <p:ph type="sldNum" sz="quarter" idx="12"/>
+          </p:nvPr>
+        </p:nvSpPr>
+        <p:spPr/>
+        <p:txBody>
+          <a:bodyPr/>
+          <a:lstStyle/>
+          <a:p>
+            <a:fld id="{62CBAC88-EF5B-3148-888C-824478CD1B05}" type="slidenum">
+              <a:rPr lang="en-US" smtClean="0"/>
+              <a:t>6</a:t>
+            </a:fld>
+            <a:endParaRPr lang="en-US"/>
+          </a:p>
+        </p:txBody>
+      </p:sp>
     </p:spTree>
     <p:extLst>
       <p:ext uri="{BB962C8B-B14F-4D97-AF65-F5344CB8AC3E}">
@@ -12171,6 +15314,60 @@
           </a:p>
         </p:txBody>
       </p:sp>
+      <p:sp>
+        <p:nvSpPr>
+          <p:cNvPr id="4" name="Footer Placeholder 3">
+            <a:extLst>
+              <a:ext uri="{FF2B5EF4-FFF2-40B4-BE49-F238E27FC236}">
+                <a16:creationId xmlns:a16="http://schemas.microsoft.com/office/drawing/2014/main" id="{6870F2A8-4B83-7647-A7CB-C1BDE9CCE3FF}"/>
+              </a:ext>
+            </a:extLst>
+          </p:cNvPr>
+          <p:cNvSpPr>
+            <a:spLocks noGrp="1"/>
+          </p:cNvSpPr>
+          <p:nvPr>
+            <p:ph type="ftr" sz="quarter" idx="11"/>
+          </p:nvPr>
+        </p:nvSpPr>
+        <p:spPr/>
+        <p:txBody>
+          <a:bodyPr/>
+          <a:lstStyle/>
+          <a:p>
+            <a:endParaRPr lang="en-US"/>
+          </a:p>
+        </p:txBody>
+      </p:sp>
+      <p:sp>
+        <p:nvSpPr>
+          <p:cNvPr id="5" name="Slide Number Placeholder 4">
+            <a:extLst>
+              <a:ext uri="{FF2B5EF4-FFF2-40B4-BE49-F238E27FC236}">
+                <a16:creationId xmlns:a16="http://schemas.microsoft.com/office/drawing/2014/main" id="{5675B6D7-DBB8-FBD5-1ECB-E7832BDCE295}"/>
+              </a:ext>
+            </a:extLst>
+          </p:cNvPr>
+          <p:cNvSpPr>
+            <a:spLocks noGrp="1"/>
+          </p:cNvSpPr>
+          <p:nvPr>
+            <p:ph type="sldNum" sz="quarter" idx="12"/>
+          </p:nvPr>
+        </p:nvSpPr>
+        <p:spPr/>
+        <p:txBody>
+          <a:bodyPr/>
+          <a:lstStyle/>
+          <a:p>
+            <a:fld id="{62CBAC88-EF5B-3148-888C-824478CD1B05}" type="slidenum">
+              <a:rPr lang="en-US" smtClean="0"/>
+              <a:t>60</a:t>
+            </a:fld>
+            <a:endParaRPr lang="en-US"/>
+          </a:p>
+        </p:txBody>
+      </p:sp>
     </p:spTree>
     <p:extLst>
       <p:ext uri="{BB962C8B-B14F-4D97-AF65-F5344CB8AC3E}">
@@ -12387,6 +15584,60 @@
           </a:p>
         </p:txBody>
       </p:sp>
+      <p:sp>
+        <p:nvSpPr>
+          <p:cNvPr id="4" name="Footer Placeholder 3">
+            <a:extLst>
+              <a:ext uri="{FF2B5EF4-FFF2-40B4-BE49-F238E27FC236}">
+                <a16:creationId xmlns:a16="http://schemas.microsoft.com/office/drawing/2014/main" id="{A43A6B57-B048-CDE5-581A-32DDD6774256}"/>
+              </a:ext>
+            </a:extLst>
+          </p:cNvPr>
+          <p:cNvSpPr>
+            <a:spLocks noGrp="1"/>
+          </p:cNvSpPr>
+          <p:nvPr>
+            <p:ph type="ftr" sz="quarter" idx="11"/>
+          </p:nvPr>
+        </p:nvSpPr>
+        <p:spPr/>
+        <p:txBody>
+          <a:bodyPr/>
+          <a:lstStyle/>
+          <a:p>
+            <a:endParaRPr lang="en-US"/>
+          </a:p>
+        </p:txBody>
+      </p:sp>
+      <p:sp>
+        <p:nvSpPr>
+          <p:cNvPr id="5" name="Slide Number Placeholder 4">
+            <a:extLst>
+              <a:ext uri="{FF2B5EF4-FFF2-40B4-BE49-F238E27FC236}">
+                <a16:creationId xmlns:a16="http://schemas.microsoft.com/office/drawing/2014/main" id="{8FC3CDFF-09B9-F202-7B5A-E0D7FFFE2D05}"/>
+              </a:ext>
+            </a:extLst>
+          </p:cNvPr>
+          <p:cNvSpPr>
+            <a:spLocks noGrp="1"/>
+          </p:cNvSpPr>
+          <p:nvPr>
+            <p:ph type="sldNum" sz="quarter" idx="12"/>
+          </p:nvPr>
+        </p:nvSpPr>
+        <p:spPr/>
+        <p:txBody>
+          <a:bodyPr/>
+          <a:lstStyle/>
+          <a:p>
+            <a:fld id="{62CBAC88-EF5B-3148-888C-824478CD1B05}" type="slidenum">
+              <a:rPr lang="en-US" smtClean="0"/>
+              <a:t>61</a:t>
+            </a:fld>
+            <a:endParaRPr lang="en-US"/>
+          </a:p>
+        </p:txBody>
+      </p:sp>
     </p:spTree>
     <p:extLst>
       <p:ext uri="{BB962C8B-B14F-4D97-AF65-F5344CB8AC3E}">
@@ -12525,6 +15776,60 @@
           </a:p>
         </p:txBody>
       </p:sp>
+      <p:sp>
+        <p:nvSpPr>
+          <p:cNvPr id="4" name="Footer Placeholder 3">
+            <a:extLst>
+              <a:ext uri="{FF2B5EF4-FFF2-40B4-BE49-F238E27FC236}">
+                <a16:creationId xmlns:a16="http://schemas.microsoft.com/office/drawing/2014/main" id="{27368ABB-2310-0721-B6BD-88F568D69A90}"/>
+              </a:ext>
+            </a:extLst>
+          </p:cNvPr>
+          <p:cNvSpPr>
+            <a:spLocks noGrp="1"/>
+          </p:cNvSpPr>
+          <p:nvPr>
+            <p:ph type="ftr" sz="quarter" idx="11"/>
+          </p:nvPr>
+        </p:nvSpPr>
+        <p:spPr/>
+        <p:txBody>
+          <a:bodyPr/>
+          <a:lstStyle/>
+          <a:p>
+            <a:endParaRPr lang="en-US"/>
+          </a:p>
+        </p:txBody>
+      </p:sp>
+      <p:sp>
+        <p:nvSpPr>
+          <p:cNvPr id="5" name="Slide Number Placeholder 4">
+            <a:extLst>
+              <a:ext uri="{FF2B5EF4-FFF2-40B4-BE49-F238E27FC236}">
+                <a16:creationId xmlns:a16="http://schemas.microsoft.com/office/drawing/2014/main" id="{31EA0B8E-E08D-2F80-D4C0-9A472FAED96B}"/>
+              </a:ext>
+            </a:extLst>
+          </p:cNvPr>
+          <p:cNvSpPr>
+            <a:spLocks noGrp="1"/>
+          </p:cNvSpPr>
+          <p:nvPr>
+            <p:ph type="sldNum" sz="quarter" idx="12"/>
+          </p:nvPr>
+        </p:nvSpPr>
+        <p:spPr/>
+        <p:txBody>
+          <a:bodyPr/>
+          <a:lstStyle/>
+          <a:p>
+            <a:fld id="{62CBAC88-EF5B-3148-888C-824478CD1B05}" type="slidenum">
+              <a:rPr lang="en-US" smtClean="0"/>
+              <a:t>62</a:t>
+            </a:fld>
+            <a:endParaRPr lang="en-US"/>
+          </a:p>
+        </p:txBody>
+      </p:sp>
     </p:spTree>
     <p:extLst>
       <p:ext uri="{BB962C8B-B14F-4D97-AF65-F5344CB8AC3E}">
@@ -12652,6 +15957,60 @@
           </a:p>
         </p:txBody>
       </p:sp>
+      <p:sp>
+        <p:nvSpPr>
+          <p:cNvPr id="4" name="Footer Placeholder 3">
+            <a:extLst>
+              <a:ext uri="{FF2B5EF4-FFF2-40B4-BE49-F238E27FC236}">
+                <a16:creationId xmlns:a16="http://schemas.microsoft.com/office/drawing/2014/main" id="{82C98FEF-0891-B52D-0274-EF7C9245DD0A}"/>
+              </a:ext>
+            </a:extLst>
+          </p:cNvPr>
+          <p:cNvSpPr>
+            <a:spLocks noGrp="1"/>
+          </p:cNvSpPr>
+          <p:nvPr>
+            <p:ph type="ftr" sz="quarter" idx="11"/>
+          </p:nvPr>
+        </p:nvSpPr>
+        <p:spPr/>
+        <p:txBody>
+          <a:bodyPr/>
+          <a:lstStyle/>
+          <a:p>
+            <a:endParaRPr lang="en-US"/>
+          </a:p>
+        </p:txBody>
+      </p:sp>
+      <p:sp>
+        <p:nvSpPr>
+          <p:cNvPr id="5" name="Slide Number Placeholder 4">
+            <a:extLst>
+              <a:ext uri="{FF2B5EF4-FFF2-40B4-BE49-F238E27FC236}">
+                <a16:creationId xmlns:a16="http://schemas.microsoft.com/office/drawing/2014/main" id="{4B1C1326-ECAC-7828-B1B8-DB6D7634A5F1}"/>
+              </a:ext>
+            </a:extLst>
+          </p:cNvPr>
+          <p:cNvSpPr>
+            <a:spLocks noGrp="1"/>
+          </p:cNvSpPr>
+          <p:nvPr>
+            <p:ph type="sldNum" sz="quarter" idx="12"/>
+          </p:nvPr>
+        </p:nvSpPr>
+        <p:spPr/>
+        <p:txBody>
+          <a:bodyPr/>
+          <a:lstStyle/>
+          <a:p>
+            <a:fld id="{62CBAC88-EF5B-3148-888C-824478CD1B05}" type="slidenum">
+              <a:rPr lang="en-US" smtClean="0"/>
+              <a:t>63</a:t>
+            </a:fld>
+            <a:endParaRPr lang="en-US"/>
+          </a:p>
+        </p:txBody>
+      </p:sp>
     </p:spTree>
     <p:extLst>
       <p:ext uri="{BB962C8B-B14F-4D97-AF65-F5344CB8AC3E}">
@@ -12832,6 +16191,60 @@
           </a:p>
         </p:txBody>
       </p:sp>
+      <p:sp>
+        <p:nvSpPr>
+          <p:cNvPr id="4" name="Footer Placeholder 3">
+            <a:extLst>
+              <a:ext uri="{FF2B5EF4-FFF2-40B4-BE49-F238E27FC236}">
+                <a16:creationId xmlns:a16="http://schemas.microsoft.com/office/drawing/2014/main" id="{BC33E84D-BB1D-02D1-7147-C45A3D474680}"/>
+              </a:ext>
+            </a:extLst>
+          </p:cNvPr>
+          <p:cNvSpPr>
+            <a:spLocks noGrp="1"/>
+          </p:cNvSpPr>
+          <p:nvPr>
+            <p:ph type="ftr" sz="quarter" idx="11"/>
+          </p:nvPr>
+        </p:nvSpPr>
+        <p:spPr/>
+        <p:txBody>
+          <a:bodyPr/>
+          <a:lstStyle/>
+          <a:p>
+            <a:endParaRPr lang="en-US"/>
+          </a:p>
+        </p:txBody>
+      </p:sp>
+      <p:sp>
+        <p:nvSpPr>
+          <p:cNvPr id="5" name="Slide Number Placeholder 4">
+            <a:extLst>
+              <a:ext uri="{FF2B5EF4-FFF2-40B4-BE49-F238E27FC236}">
+                <a16:creationId xmlns:a16="http://schemas.microsoft.com/office/drawing/2014/main" id="{EBE9CECC-D407-C9A7-4BD5-7BCB603BC42E}"/>
+              </a:ext>
+            </a:extLst>
+          </p:cNvPr>
+          <p:cNvSpPr>
+            <a:spLocks noGrp="1"/>
+          </p:cNvSpPr>
+          <p:nvPr>
+            <p:ph type="sldNum" sz="quarter" idx="12"/>
+          </p:nvPr>
+        </p:nvSpPr>
+        <p:spPr/>
+        <p:txBody>
+          <a:bodyPr/>
+          <a:lstStyle/>
+          <a:p>
+            <a:fld id="{62CBAC88-EF5B-3148-888C-824478CD1B05}" type="slidenum">
+              <a:rPr lang="en-US" smtClean="0"/>
+              <a:t>64</a:t>
+            </a:fld>
+            <a:endParaRPr lang="en-US"/>
+          </a:p>
+        </p:txBody>
+      </p:sp>
     </p:spTree>
     <p:extLst>
       <p:ext uri="{BB962C8B-B14F-4D97-AF65-F5344CB8AC3E}">
@@ -13007,6 +16420,60 @@
           </a:p>
         </p:txBody>
       </p:sp>
+      <p:sp>
+        <p:nvSpPr>
+          <p:cNvPr id="4" name="Footer Placeholder 3">
+            <a:extLst>
+              <a:ext uri="{FF2B5EF4-FFF2-40B4-BE49-F238E27FC236}">
+                <a16:creationId xmlns:a16="http://schemas.microsoft.com/office/drawing/2014/main" id="{9029CB6C-74D4-51ED-A4AD-F50F2A216486}"/>
+              </a:ext>
+            </a:extLst>
+          </p:cNvPr>
+          <p:cNvSpPr>
+            <a:spLocks noGrp="1"/>
+          </p:cNvSpPr>
+          <p:nvPr>
+            <p:ph type="ftr" sz="quarter" idx="11"/>
+          </p:nvPr>
+        </p:nvSpPr>
+        <p:spPr/>
+        <p:txBody>
+          <a:bodyPr/>
+          <a:lstStyle/>
+          <a:p>
+            <a:endParaRPr lang="en-US"/>
+          </a:p>
+        </p:txBody>
+      </p:sp>
+      <p:sp>
+        <p:nvSpPr>
+          <p:cNvPr id="5" name="Slide Number Placeholder 4">
+            <a:extLst>
+              <a:ext uri="{FF2B5EF4-FFF2-40B4-BE49-F238E27FC236}">
+                <a16:creationId xmlns:a16="http://schemas.microsoft.com/office/drawing/2014/main" id="{C1A6D88F-39DB-60CB-7479-1DFD2D97CD9A}"/>
+              </a:ext>
+            </a:extLst>
+          </p:cNvPr>
+          <p:cNvSpPr>
+            <a:spLocks noGrp="1"/>
+          </p:cNvSpPr>
+          <p:nvPr>
+            <p:ph type="sldNum" sz="quarter" idx="12"/>
+          </p:nvPr>
+        </p:nvSpPr>
+        <p:spPr/>
+        <p:txBody>
+          <a:bodyPr/>
+          <a:lstStyle/>
+          <a:p>
+            <a:fld id="{62CBAC88-EF5B-3148-888C-824478CD1B05}" type="slidenum">
+              <a:rPr lang="en-US" smtClean="0"/>
+              <a:t>65</a:t>
+            </a:fld>
+            <a:endParaRPr lang="en-US"/>
+          </a:p>
+        </p:txBody>
+      </p:sp>
     </p:spTree>
     <p:extLst>
       <p:ext uri="{BB962C8B-B14F-4D97-AF65-F5344CB8AC3E}">
@@ -13177,6 +16644,60 @@
           </a:p>
         </p:txBody>
       </p:sp>
+      <p:sp>
+        <p:nvSpPr>
+          <p:cNvPr id="4" name="Footer Placeholder 3">
+            <a:extLst>
+              <a:ext uri="{FF2B5EF4-FFF2-40B4-BE49-F238E27FC236}">
+                <a16:creationId xmlns:a16="http://schemas.microsoft.com/office/drawing/2014/main" id="{C7AF433D-0483-E4EC-6FEF-92E010FB7849}"/>
+              </a:ext>
+            </a:extLst>
+          </p:cNvPr>
+          <p:cNvSpPr>
+            <a:spLocks noGrp="1"/>
+          </p:cNvSpPr>
+          <p:nvPr>
+            <p:ph type="ftr" sz="quarter" idx="11"/>
+          </p:nvPr>
+        </p:nvSpPr>
+        <p:spPr/>
+        <p:txBody>
+          <a:bodyPr/>
+          <a:lstStyle/>
+          <a:p>
+            <a:endParaRPr lang="en-US"/>
+          </a:p>
+        </p:txBody>
+      </p:sp>
+      <p:sp>
+        <p:nvSpPr>
+          <p:cNvPr id="5" name="Slide Number Placeholder 4">
+            <a:extLst>
+              <a:ext uri="{FF2B5EF4-FFF2-40B4-BE49-F238E27FC236}">
+                <a16:creationId xmlns:a16="http://schemas.microsoft.com/office/drawing/2014/main" id="{D58D55C2-4892-1072-8F57-29FD3EFA02F5}"/>
+              </a:ext>
+            </a:extLst>
+          </p:cNvPr>
+          <p:cNvSpPr>
+            <a:spLocks noGrp="1"/>
+          </p:cNvSpPr>
+          <p:nvPr>
+            <p:ph type="sldNum" sz="quarter" idx="12"/>
+          </p:nvPr>
+        </p:nvSpPr>
+        <p:spPr/>
+        <p:txBody>
+          <a:bodyPr/>
+          <a:lstStyle/>
+          <a:p>
+            <a:fld id="{62CBAC88-EF5B-3148-888C-824478CD1B05}" type="slidenum">
+              <a:rPr lang="en-US" smtClean="0"/>
+              <a:t>66</a:t>
+            </a:fld>
+            <a:endParaRPr lang="en-US"/>
+          </a:p>
+        </p:txBody>
+      </p:sp>
     </p:spTree>
     <p:extLst>
       <p:ext uri="{BB962C8B-B14F-4D97-AF65-F5344CB8AC3E}">
@@ -13391,6 +16912,60 @@
           </a:p>
         </p:txBody>
       </p:sp>
+      <p:sp>
+        <p:nvSpPr>
+          <p:cNvPr id="4" name="Footer Placeholder 3">
+            <a:extLst>
+              <a:ext uri="{FF2B5EF4-FFF2-40B4-BE49-F238E27FC236}">
+                <a16:creationId xmlns:a16="http://schemas.microsoft.com/office/drawing/2014/main" id="{EC2EFF2F-B123-131A-2E11-1D8D9E48BFD4}"/>
+              </a:ext>
+            </a:extLst>
+          </p:cNvPr>
+          <p:cNvSpPr>
+            <a:spLocks noGrp="1"/>
+          </p:cNvSpPr>
+          <p:nvPr>
+            <p:ph type="ftr" sz="quarter" idx="11"/>
+          </p:nvPr>
+        </p:nvSpPr>
+        <p:spPr/>
+        <p:txBody>
+          <a:bodyPr/>
+          <a:lstStyle/>
+          <a:p>
+            <a:endParaRPr lang="en-US"/>
+          </a:p>
+        </p:txBody>
+      </p:sp>
+      <p:sp>
+        <p:nvSpPr>
+          <p:cNvPr id="5" name="Slide Number Placeholder 4">
+            <a:extLst>
+              <a:ext uri="{FF2B5EF4-FFF2-40B4-BE49-F238E27FC236}">
+                <a16:creationId xmlns:a16="http://schemas.microsoft.com/office/drawing/2014/main" id="{43B9D1C4-9503-111E-4B9E-D0241A5903C4}"/>
+              </a:ext>
+            </a:extLst>
+          </p:cNvPr>
+          <p:cNvSpPr>
+            <a:spLocks noGrp="1"/>
+          </p:cNvSpPr>
+          <p:nvPr>
+            <p:ph type="sldNum" sz="quarter" idx="12"/>
+          </p:nvPr>
+        </p:nvSpPr>
+        <p:spPr/>
+        <p:txBody>
+          <a:bodyPr/>
+          <a:lstStyle/>
+          <a:p>
+            <a:fld id="{62CBAC88-EF5B-3148-888C-824478CD1B05}" type="slidenum">
+              <a:rPr lang="en-US" smtClean="0"/>
+              <a:t>67</a:t>
+            </a:fld>
+            <a:endParaRPr lang="en-US"/>
+          </a:p>
+        </p:txBody>
+      </p:sp>
     </p:spTree>
     <p:extLst>
       <p:ext uri="{BB962C8B-B14F-4D97-AF65-F5344CB8AC3E}">
@@ -13538,6 +17113,60 @@
           </a:p>
         </p:txBody>
       </p:sp>
+      <p:sp>
+        <p:nvSpPr>
+          <p:cNvPr id="4" name="Footer Placeholder 3">
+            <a:extLst>
+              <a:ext uri="{FF2B5EF4-FFF2-40B4-BE49-F238E27FC236}">
+                <a16:creationId xmlns:a16="http://schemas.microsoft.com/office/drawing/2014/main" id="{C4E817BB-C699-F356-81E7-D870B89F9294}"/>
+              </a:ext>
+            </a:extLst>
+          </p:cNvPr>
+          <p:cNvSpPr>
+            <a:spLocks noGrp="1"/>
+          </p:cNvSpPr>
+          <p:nvPr>
+            <p:ph type="ftr" sz="quarter" idx="11"/>
+          </p:nvPr>
+        </p:nvSpPr>
+        <p:spPr/>
+        <p:txBody>
+          <a:bodyPr/>
+          <a:lstStyle/>
+          <a:p>
+            <a:endParaRPr lang="en-US"/>
+          </a:p>
+        </p:txBody>
+      </p:sp>
+      <p:sp>
+        <p:nvSpPr>
+          <p:cNvPr id="5" name="Slide Number Placeholder 4">
+            <a:extLst>
+              <a:ext uri="{FF2B5EF4-FFF2-40B4-BE49-F238E27FC236}">
+                <a16:creationId xmlns:a16="http://schemas.microsoft.com/office/drawing/2014/main" id="{06FDF273-0E43-1BF4-4AD7-D2D2B1AE0ABD}"/>
+              </a:ext>
+            </a:extLst>
+          </p:cNvPr>
+          <p:cNvSpPr>
+            <a:spLocks noGrp="1"/>
+          </p:cNvSpPr>
+          <p:nvPr>
+            <p:ph type="sldNum" sz="quarter" idx="12"/>
+          </p:nvPr>
+        </p:nvSpPr>
+        <p:spPr/>
+        <p:txBody>
+          <a:bodyPr/>
+          <a:lstStyle/>
+          <a:p>
+            <a:fld id="{62CBAC88-EF5B-3148-888C-824478CD1B05}" type="slidenum">
+              <a:rPr lang="en-US" smtClean="0"/>
+              <a:t>68</a:t>
+            </a:fld>
+            <a:endParaRPr lang="en-US"/>
+          </a:p>
+        </p:txBody>
+      </p:sp>
     </p:spTree>
     <p:extLst>
       <p:ext uri="{BB962C8B-B14F-4D97-AF65-F5344CB8AC3E}">
@@ -13686,6 +17315,60 @@
           </a:p>
         </p:txBody>
       </p:sp>
+      <p:sp>
+        <p:nvSpPr>
+          <p:cNvPr id="4" name="Footer Placeholder 3">
+            <a:extLst>
+              <a:ext uri="{FF2B5EF4-FFF2-40B4-BE49-F238E27FC236}">
+                <a16:creationId xmlns:a16="http://schemas.microsoft.com/office/drawing/2014/main" id="{C904FCE7-C0A8-8636-657C-438DDD1BEB3A}"/>
+              </a:ext>
+            </a:extLst>
+          </p:cNvPr>
+          <p:cNvSpPr>
+            <a:spLocks noGrp="1"/>
+          </p:cNvSpPr>
+          <p:nvPr>
+            <p:ph type="ftr" sz="quarter" idx="11"/>
+          </p:nvPr>
+        </p:nvSpPr>
+        <p:spPr/>
+        <p:txBody>
+          <a:bodyPr/>
+          <a:lstStyle/>
+          <a:p>
+            <a:endParaRPr lang="en-US"/>
+          </a:p>
+        </p:txBody>
+      </p:sp>
+      <p:sp>
+        <p:nvSpPr>
+          <p:cNvPr id="5" name="Slide Number Placeholder 4">
+            <a:extLst>
+              <a:ext uri="{FF2B5EF4-FFF2-40B4-BE49-F238E27FC236}">
+                <a16:creationId xmlns:a16="http://schemas.microsoft.com/office/drawing/2014/main" id="{9ADFCCA7-F60F-18DB-E81D-AB010BC50001}"/>
+              </a:ext>
+            </a:extLst>
+          </p:cNvPr>
+          <p:cNvSpPr>
+            <a:spLocks noGrp="1"/>
+          </p:cNvSpPr>
+          <p:nvPr>
+            <p:ph type="sldNum" sz="quarter" idx="12"/>
+          </p:nvPr>
+        </p:nvSpPr>
+        <p:spPr/>
+        <p:txBody>
+          <a:bodyPr/>
+          <a:lstStyle/>
+          <a:p>
+            <a:fld id="{62CBAC88-EF5B-3148-888C-824478CD1B05}" type="slidenum">
+              <a:rPr lang="en-US" smtClean="0"/>
+              <a:t>69</a:t>
+            </a:fld>
+            <a:endParaRPr lang="en-US"/>
+          </a:p>
+        </p:txBody>
+      </p:sp>
     </p:spTree>
     <p:extLst>
       <p:ext uri="{BB962C8B-B14F-4D97-AF65-F5344CB8AC3E}">
@@ -13824,6 +17507,60 @@
           </a:p>
         </p:txBody>
       </p:sp>
+      <p:sp>
+        <p:nvSpPr>
+          <p:cNvPr id="4" name="Footer Placeholder 3">
+            <a:extLst>
+              <a:ext uri="{FF2B5EF4-FFF2-40B4-BE49-F238E27FC236}">
+                <a16:creationId xmlns:a16="http://schemas.microsoft.com/office/drawing/2014/main" id="{B936B337-9119-FF11-B41B-5EA2AD0CEAD1}"/>
+              </a:ext>
+            </a:extLst>
+          </p:cNvPr>
+          <p:cNvSpPr>
+            <a:spLocks noGrp="1"/>
+          </p:cNvSpPr>
+          <p:nvPr>
+            <p:ph type="ftr" sz="quarter" idx="11"/>
+          </p:nvPr>
+        </p:nvSpPr>
+        <p:spPr/>
+        <p:txBody>
+          <a:bodyPr/>
+          <a:lstStyle/>
+          <a:p>
+            <a:endParaRPr lang="en-US"/>
+          </a:p>
+        </p:txBody>
+      </p:sp>
+      <p:sp>
+        <p:nvSpPr>
+          <p:cNvPr id="5" name="Slide Number Placeholder 4">
+            <a:extLst>
+              <a:ext uri="{FF2B5EF4-FFF2-40B4-BE49-F238E27FC236}">
+                <a16:creationId xmlns:a16="http://schemas.microsoft.com/office/drawing/2014/main" id="{EF90446A-D57F-468A-9CAB-3611EE82B034}"/>
+              </a:ext>
+            </a:extLst>
+          </p:cNvPr>
+          <p:cNvSpPr>
+            <a:spLocks noGrp="1"/>
+          </p:cNvSpPr>
+          <p:nvPr>
+            <p:ph type="sldNum" sz="quarter" idx="12"/>
+          </p:nvPr>
+        </p:nvSpPr>
+        <p:spPr/>
+        <p:txBody>
+          <a:bodyPr/>
+          <a:lstStyle/>
+          <a:p>
+            <a:fld id="{62CBAC88-EF5B-3148-888C-824478CD1B05}" type="slidenum">
+              <a:rPr lang="en-US" smtClean="0"/>
+              <a:t>7</a:t>
+            </a:fld>
+            <a:endParaRPr lang="en-US"/>
+          </a:p>
+        </p:txBody>
+      </p:sp>
     </p:spTree>
     <p:extLst>
       <p:ext uri="{BB962C8B-B14F-4D97-AF65-F5344CB8AC3E}">
@@ -13953,6 +17690,60 @@
           </a:p>
         </p:txBody>
       </p:sp>
+      <p:sp>
+        <p:nvSpPr>
+          <p:cNvPr id="4" name="Footer Placeholder 3">
+            <a:extLst>
+              <a:ext uri="{FF2B5EF4-FFF2-40B4-BE49-F238E27FC236}">
+                <a16:creationId xmlns:a16="http://schemas.microsoft.com/office/drawing/2014/main" id="{23489DD3-BB60-28D0-3F75-2FA5832D1ED9}"/>
+              </a:ext>
+            </a:extLst>
+          </p:cNvPr>
+          <p:cNvSpPr>
+            <a:spLocks noGrp="1"/>
+          </p:cNvSpPr>
+          <p:nvPr>
+            <p:ph type="ftr" sz="quarter" idx="11"/>
+          </p:nvPr>
+        </p:nvSpPr>
+        <p:spPr/>
+        <p:txBody>
+          <a:bodyPr/>
+          <a:lstStyle/>
+          <a:p>
+            <a:endParaRPr lang="en-US"/>
+          </a:p>
+        </p:txBody>
+      </p:sp>
+      <p:sp>
+        <p:nvSpPr>
+          <p:cNvPr id="5" name="Slide Number Placeholder 4">
+            <a:extLst>
+              <a:ext uri="{FF2B5EF4-FFF2-40B4-BE49-F238E27FC236}">
+                <a16:creationId xmlns:a16="http://schemas.microsoft.com/office/drawing/2014/main" id="{958C9761-2913-F78B-0B65-50570BA630F7}"/>
+              </a:ext>
+            </a:extLst>
+          </p:cNvPr>
+          <p:cNvSpPr>
+            <a:spLocks noGrp="1"/>
+          </p:cNvSpPr>
+          <p:nvPr>
+            <p:ph type="sldNum" sz="quarter" idx="12"/>
+          </p:nvPr>
+        </p:nvSpPr>
+        <p:spPr/>
+        <p:txBody>
+          <a:bodyPr/>
+          <a:lstStyle/>
+          <a:p>
+            <a:fld id="{62CBAC88-EF5B-3148-888C-824478CD1B05}" type="slidenum">
+              <a:rPr lang="en-US" smtClean="0"/>
+              <a:t>70</a:t>
+            </a:fld>
+            <a:endParaRPr lang="en-US"/>
+          </a:p>
+        </p:txBody>
+      </p:sp>
     </p:spTree>
     <p:extLst>
       <p:ext uri="{BB962C8B-B14F-4D97-AF65-F5344CB8AC3E}">
@@ -14118,6 +17909,60 @@
           </a:p>
         </p:txBody>
       </p:sp>
+      <p:sp>
+        <p:nvSpPr>
+          <p:cNvPr id="4" name="Footer Placeholder 3">
+            <a:extLst>
+              <a:ext uri="{FF2B5EF4-FFF2-40B4-BE49-F238E27FC236}">
+                <a16:creationId xmlns:a16="http://schemas.microsoft.com/office/drawing/2014/main" id="{93DF41F4-1294-2AEC-4DA9-C770876FC26E}"/>
+              </a:ext>
+            </a:extLst>
+          </p:cNvPr>
+          <p:cNvSpPr>
+            <a:spLocks noGrp="1"/>
+          </p:cNvSpPr>
+          <p:nvPr>
+            <p:ph type="ftr" sz="quarter" idx="11"/>
+          </p:nvPr>
+        </p:nvSpPr>
+        <p:spPr/>
+        <p:txBody>
+          <a:bodyPr/>
+          <a:lstStyle/>
+          <a:p>
+            <a:endParaRPr lang="en-US"/>
+          </a:p>
+        </p:txBody>
+      </p:sp>
+      <p:sp>
+        <p:nvSpPr>
+          <p:cNvPr id="5" name="Slide Number Placeholder 4">
+            <a:extLst>
+              <a:ext uri="{FF2B5EF4-FFF2-40B4-BE49-F238E27FC236}">
+                <a16:creationId xmlns:a16="http://schemas.microsoft.com/office/drawing/2014/main" id="{31DBF32A-E89D-3B96-F7E1-87C5E3132AE0}"/>
+              </a:ext>
+            </a:extLst>
+          </p:cNvPr>
+          <p:cNvSpPr>
+            <a:spLocks noGrp="1"/>
+          </p:cNvSpPr>
+          <p:nvPr>
+            <p:ph type="sldNum" sz="quarter" idx="12"/>
+          </p:nvPr>
+        </p:nvSpPr>
+        <p:spPr/>
+        <p:txBody>
+          <a:bodyPr/>
+          <a:lstStyle/>
+          <a:p>
+            <a:fld id="{62CBAC88-EF5B-3148-888C-824478CD1B05}" type="slidenum">
+              <a:rPr lang="en-US" smtClean="0"/>
+              <a:t>8</a:t>
+            </a:fld>
+            <a:endParaRPr lang="en-US"/>
+          </a:p>
+        </p:txBody>
+      </p:sp>
     </p:spTree>
     <p:extLst>
       <p:ext uri="{BB962C8B-B14F-4D97-AF65-F5344CB8AC3E}">
@@ -14319,6 +18164,60 @@
           </a:p>
           <a:p>
             <a:endParaRPr lang="en-US" sz="2400" dirty="0"/>
+          </a:p>
+        </p:txBody>
+      </p:sp>
+      <p:sp>
+        <p:nvSpPr>
+          <p:cNvPr id="2" name="Footer Placeholder 1">
+            <a:extLst>
+              <a:ext uri="{FF2B5EF4-FFF2-40B4-BE49-F238E27FC236}">
+                <a16:creationId xmlns:a16="http://schemas.microsoft.com/office/drawing/2014/main" id="{9DC283BE-7866-0606-8401-BECA817923D6}"/>
+              </a:ext>
+            </a:extLst>
+          </p:cNvPr>
+          <p:cNvSpPr>
+            <a:spLocks noGrp="1"/>
+          </p:cNvSpPr>
+          <p:nvPr>
+            <p:ph type="ftr" sz="quarter" idx="11"/>
+          </p:nvPr>
+        </p:nvSpPr>
+        <p:spPr/>
+        <p:txBody>
+          <a:bodyPr/>
+          <a:lstStyle/>
+          <a:p>
+            <a:endParaRPr lang="en-US"/>
+          </a:p>
+        </p:txBody>
+      </p:sp>
+      <p:sp>
+        <p:nvSpPr>
+          <p:cNvPr id="5" name="Slide Number Placeholder 4">
+            <a:extLst>
+              <a:ext uri="{FF2B5EF4-FFF2-40B4-BE49-F238E27FC236}">
+                <a16:creationId xmlns:a16="http://schemas.microsoft.com/office/drawing/2014/main" id="{F4904C7B-9B5F-6D5A-091D-6C450CB20497}"/>
+              </a:ext>
+            </a:extLst>
+          </p:cNvPr>
+          <p:cNvSpPr>
+            <a:spLocks noGrp="1"/>
+          </p:cNvSpPr>
+          <p:nvPr>
+            <p:ph type="sldNum" sz="quarter" idx="12"/>
+          </p:nvPr>
+        </p:nvSpPr>
+        <p:spPr/>
+        <p:txBody>
+          <a:bodyPr/>
+          <a:lstStyle/>
+          <a:p>
+            <a:fld id="{62CBAC88-EF5B-3148-888C-824478CD1B05}" type="slidenum">
+              <a:rPr lang="en-US" smtClean="0"/>
+              <a:t>9</a:t>
+            </a:fld>
+            <a:endParaRPr lang="en-US"/>
           </a:p>
         </p:txBody>
       </p:sp>

</xml_diff>